<commit_message>
Updated the project presentation
</commit_message>
<xml_diff>
--- a/Distributed_Systems_Presentation_11june.pptx
+++ b/Distributed_Systems_Presentation_11june.pptx
@@ -105,8 +105,8 @@
         </p:nvSpPr>
         <p:spPr>
           <a:xfrm>
-            <a:off x="311760" y="744480"/>
-            <a:ext cx="8519400" cy="2051640"/>
+            <a:off x="457200" y="205200"/>
+            <a:ext cx="8229240" cy="858600"/>
           </a:xfrm>
           <a:prstGeom prst="rect">
             <a:avLst/>
@@ -115,10 +115,8 @@
         <p:txBody>
           <a:bodyPr lIns="0" rIns="0" tIns="0" bIns="0" anchor="ctr"/>
           <a:p>
-            <a:endParaRPr b="0" lang="en-US" sz="1400" spc="-1" strike="noStrike">
-              <a:solidFill>
-                <a:srgbClr val="000000"/>
-              </a:solidFill>
+            <a:pPr algn="ctr"/>
+            <a:endParaRPr b="0" lang="en-US" sz="4400" spc="-1" strike="noStrike">
               <a:latin typeface="Arial"/>
             </a:endParaRPr>
           </a:p>
@@ -137,7 +135,7 @@
         <p:spPr>
           <a:xfrm>
             <a:off x="457200" y="1203480"/>
-            <a:ext cx="8228880" cy="1422360"/>
+            <a:ext cx="8229240" cy="1422720"/>
           </a:xfrm>
           <a:prstGeom prst="rect">
             <a:avLst/>
@@ -148,10 +146,7 @@
             <a:normAutofit/>
           </a:bodyPr>
           <a:p>
-            <a:endParaRPr b="0" lang="en-US" sz="1400" spc="-1" strike="noStrike">
-              <a:solidFill>
-                <a:srgbClr val="000000"/>
-              </a:solidFill>
+            <a:endParaRPr b="0" lang="en-US" sz="3200" spc="-1" strike="noStrike">
               <a:latin typeface="Arial"/>
             </a:endParaRPr>
           </a:p>
@@ -169,8 +164,8 @@
         </p:nvSpPr>
         <p:spPr>
           <a:xfrm>
-            <a:off x="457200" y="2761200"/>
-            <a:ext cx="8228880" cy="1422360"/>
+            <a:off x="457200" y="2761920"/>
+            <a:ext cx="8229240" cy="1422720"/>
           </a:xfrm>
           <a:prstGeom prst="rect">
             <a:avLst/>
@@ -181,10 +176,7 @@
             <a:normAutofit/>
           </a:bodyPr>
           <a:p>
-            <a:endParaRPr b="0" lang="en-US" sz="1400" spc="-1" strike="noStrike">
-              <a:solidFill>
-                <a:srgbClr val="000000"/>
-              </a:solidFill>
+            <a:endParaRPr b="0" lang="en-US" sz="3200" spc="-1" strike="noStrike">
               <a:latin typeface="Arial"/>
             </a:endParaRPr>
           </a:p>
@@ -224,8 +216,8 @@
         </p:nvSpPr>
         <p:spPr>
           <a:xfrm>
-            <a:off x="311760" y="744480"/>
-            <a:ext cx="8519400" cy="2051640"/>
+            <a:off x="457200" y="205200"/>
+            <a:ext cx="8229240" cy="858600"/>
           </a:xfrm>
           <a:prstGeom prst="rect">
             <a:avLst/>
@@ -234,10 +226,8 @@
         <p:txBody>
           <a:bodyPr lIns="0" rIns="0" tIns="0" bIns="0" anchor="ctr"/>
           <a:p>
-            <a:endParaRPr b="0" lang="en-US" sz="1400" spc="-1" strike="noStrike">
-              <a:solidFill>
-                <a:srgbClr val="000000"/>
-              </a:solidFill>
+            <a:pPr algn="ctr"/>
+            <a:endParaRPr b="0" lang="en-US" sz="4400" spc="-1" strike="noStrike">
               <a:latin typeface="Arial"/>
             </a:endParaRPr>
           </a:p>
@@ -256,7 +246,7 @@
         <p:spPr>
           <a:xfrm>
             <a:off x="457200" y="1203480"/>
-            <a:ext cx="4015440" cy="1422360"/>
+            <a:ext cx="4015800" cy="1422720"/>
           </a:xfrm>
           <a:prstGeom prst="rect">
             <a:avLst/>
@@ -267,10 +257,7 @@
             <a:normAutofit/>
           </a:bodyPr>
           <a:p>
-            <a:endParaRPr b="0" lang="en-US" sz="1400" spc="-1" strike="noStrike">
-              <a:solidFill>
-                <a:srgbClr val="000000"/>
-              </a:solidFill>
+            <a:endParaRPr b="0" lang="en-US" sz="3200" spc="-1" strike="noStrike">
               <a:latin typeface="Arial"/>
             </a:endParaRPr>
           </a:p>
@@ -288,8 +275,8 @@
         </p:nvSpPr>
         <p:spPr>
           <a:xfrm>
-            <a:off x="4673880" y="1203480"/>
-            <a:ext cx="4015440" cy="1422360"/>
+            <a:off x="4674240" y="1203480"/>
+            <a:ext cx="4015800" cy="1422720"/>
           </a:xfrm>
           <a:prstGeom prst="rect">
             <a:avLst/>
@@ -300,10 +287,7 @@
             <a:normAutofit/>
           </a:bodyPr>
           <a:p>
-            <a:endParaRPr b="0" lang="en-US" sz="1400" spc="-1" strike="noStrike">
-              <a:solidFill>
-                <a:srgbClr val="000000"/>
-              </a:solidFill>
+            <a:endParaRPr b="0" lang="en-US" sz="3200" spc="-1" strike="noStrike">
               <a:latin typeface="Arial"/>
             </a:endParaRPr>
           </a:p>
@@ -321,8 +305,8 @@
         </p:nvSpPr>
         <p:spPr>
           <a:xfrm>
-            <a:off x="457200" y="2761200"/>
-            <a:ext cx="4015440" cy="1422360"/>
+            <a:off x="457200" y="2761920"/>
+            <a:ext cx="4015800" cy="1422720"/>
           </a:xfrm>
           <a:prstGeom prst="rect">
             <a:avLst/>
@@ -333,10 +317,7 @@
             <a:normAutofit/>
           </a:bodyPr>
           <a:p>
-            <a:endParaRPr b="0" lang="en-US" sz="1400" spc="-1" strike="noStrike">
-              <a:solidFill>
-                <a:srgbClr val="000000"/>
-              </a:solidFill>
+            <a:endParaRPr b="0" lang="en-US" sz="3200" spc="-1" strike="noStrike">
               <a:latin typeface="Arial"/>
             </a:endParaRPr>
           </a:p>
@@ -354,8 +335,8 @@
         </p:nvSpPr>
         <p:spPr>
           <a:xfrm>
-            <a:off x="4673880" y="2761200"/>
-            <a:ext cx="4015440" cy="1422360"/>
+            <a:off x="4674240" y="2761920"/>
+            <a:ext cx="4015800" cy="1422720"/>
           </a:xfrm>
           <a:prstGeom prst="rect">
             <a:avLst/>
@@ -366,10 +347,7 @@
             <a:normAutofit/>
           </a:bodyPr>
           <a:p>
-            <a:endParaRPr b="0" lang="en-US" sz="1400" spc="-1" strike="noStrike">
-              <a:solidFill>
-                <a:srgbClr val="000000"/>
-              </a:solidFill>
+            <a:endParaRPr b="0" lang="en-US" sz="3200" spc="-1" strike="noStrike">
               <a:latin typeface="Arial"/>
             </a:endParaRPr>
           </a:p>
@@ -409,8 +387,8 @@
         </p:nvSpPr>
         <p:spPr>
           <a:xfrm>
-            <a:off x="311760" y="744480"/>
-            <a:ext cx="8519400" cy="2051640"/>
+            <a:off x="457200" y="205200"/>
+            <a:ext cx="8229240" cy="858600"/>
           </a:xfrm>
           <a:prstGeom prst="rect">
             <a:avLst/>
@@ -419,10 +397,8 @@
         <p:txBody>
           <a:bodyPr lIns="0" rIns="0" tIns="0" bIns="0" anchor="ctr"/>
           <a:p>
-            <a:endParaRPr b="0" lang="en-US" sz="1400" spc="-1" strike="noStrike">
-              <a:solidFill>
-                <a:srgbClr val="000000"/>
-              </a:solidFill>
+            <a:pPr algn="ctr"/>
+            <a:endParaRPr b="0" lang="en-US" sz="4400" spc="-1" strike="noStrike">
               <a:latin typeface="Arial"/>
             </a:endParaRPr>
           </a:p>
@@ -441,7 +417,7 @@
         <p:spPr>
           <a:xfrm>
             <a:off x="457200" y="1203480"/>
-            <a:ext cx="2649600" cy="1422360"/>
+            <a:ext cx="2649600" cy="1422720"/>
           </a:xfrm>
           <a:prstGeom prst="rect">
             <a:avLst/>
@@ -452,10 +428,7 @@
             <a:normAutofit/>
           </a:bodyPr>
           <a:p>
-            <a:endParaRPr b="0" lang="en-US" sz="1400" spc="-1" strike="noStrike">
-              <a:solidFill>
-                <a:srgbClr val="000000"/>
-              </a:solidFill>
+            <a:endParaRPr b="0" lang="en-US" sz="3200" spc="-1" strike="noStrike">
               <a:latin typeface="Arial"/>
             </a:endParaRPr>
           </a:p>
@@ -474,7 +447,7 @@
         <p:spPr>
           <a:xfrm>
             <a:off x="3239640" y="1203480"/>
-            <a:ext cx="2649600" cy="1422360"/>
+            <a:ext cx="2649600" cy="1422720"/>
           </a:xfrm>
           <a:prstGeom prst="rect">
             <a:avLst/>
@@ -485,10 +458,7 @@
             <a:normAutofit/>
           </a:bodyPr>
           <a:p>
-            <a:endParaRPr b="0" lang="en-US" sz="1400" spc="-1" strike="noStrike">
-              <a:solidFill>
-                <a:srgbClr val="000000"/>
-              </a:solidFill>
+            <a:endParaRPr b="0" lang="en-US" sz="3200" spc="-1" strike="noStrike">
               <a:latin typeface="Arial"/>
             </a:endParaRPr>
           </a:p>
@@ -507,7 +477,7 @@
         <p:spPr>
           <a:xfrm>
             <a:off x="6022080" y="1203480"/>
-            <a:ext cx="2649600" cy="1422360"/>
+            <a:ext cx="2649600" cy="1422720"/>
           </a:xfrm>
           <a:prstGeom prst="rect">
             <a:avLst/>
@@ -518,10 +488,7 @@
             <a:normAutofit/>
           </a:bodyPr>
           <a:p>
-            <a:endParaRPr b="0" lang="en-US" sz="1400" spc="-1" strike="noStrike">
-              <a:solidFill>
-                <a:srgbClr val="000000"/>
-              </a:solidFill>
+            <a:endParaRPr b="0" lang="en-US" sz="3200" spc="-1" strike="noStrike">
               <a:latin typeface="Arial"/>
             </a:endParaRPr>
           </a:p>
@@ -539,8 +506,8 @@
         </p:nvSpPr>
         <p:spPr>
           <a:xfrm>
-            <a:off x="457200" y="2761200"/>
-            <a:ext cx="2649600" cy="1422360"/>
+            <a:off x="457200" y="2761920"/>
+            <a:ext cx="2649600" cy="1422720"/>
           </a:xfrm>
           <a:prstGeom prst="rect">
             <a:avLst/>
@@ -551,10 +518,7 @@
             <a:normAutofit/>
           </a:bodyPr>
           <a:p>
-            <a:endParaRPr b="0" lang="en-US" sz="1400" spc="-1" strike="noStrike">
-              <a:solidFill>
-                <a:srgbClr val="000000"/>
-              </a:solidFill>
+            <a:endParaRPr b="0" lang="en-US" sz="3200" spc="-1" strike="noStrike">
               <a:latin typeface="Arial"/>
             </a:endParaRPr>
           </a:p>
@@ -572,8 +536,8 @@
         </p:nvSpPr>
         <p:spPr>
           <a:xfrm>
-            <a:off x="3239640" y="2761200"/>
-            <a:ext cx="2649600" cy="1422360"/>
+            <a:off x="3239640" y="2761920"/>
+            <a:ext cx="2649600" cy="1422720"/>
           </a:xfrm>
           <a:prstGeom prst="rect">
             <a:avLst/>
@@ -584,10 +548,7 @@
             <a:normAutofit/>
           </a:bodyPr>
           <a:p>
-            <a:endParaRPr b="0" lang="en-US" sz="1400" spc="-1" strike="noStrike">
-              <a:solidFill>
-                <a:srgbClr val="000000"/>
-              </a:solidFill>
+            <a:endParaRPr b="0" lang="en-US" sz="3200" spc="-1" strike="noStrike">
               <a:latin typeface="Arial"/>
             </a:endParaRPr>
           </a:p>
@@ -605,8 +566,8 @@
         </p:nvSpPr>
         <p:spPr>
           <a:xfrm>
-            <a:off x="6022080" y="2761200"/>
-            <a:ext cx="2649600" cy="1422360"/>
+            <a:off x="6022080" y="2761920"/>
+            <a:ext cx="2649600" cy="1422720"/>
           </a:xfrm>
           <a:prstGeom prst="rect">
             <a:avLst/>
@@ -617,10 +578,7 @@
             <a:normAutofit/>
           </a:bodyPr>
           <a:p>
-            <a:endParaRPr b="0" lang="en-US" sz="1400" spc="-1" strike="noStrike">
-              <a:solidFill>
-                <a:srgbClr val="000000"/>
-              </a:solidFill>
+            <a:endParaRPr b="0" lang="en-US" sz="3200" spc="-1" strike="noStrike">
               <a:latin typeface="Arial"/>
             </a:endParaRPr>
           </a:p>
@@ -660,8 +618,8 @@
         </p:nvSpPr>
         <p:spPr>
           <a:xfrm>
-            <a:off x="311760" y="744480"/>
-            <a:ext cx="8519400" cy="2051640"/>
+            <a:off x="457200" y="205200"/>
+            <a:ext cx="8229240" cy="858600"/>
           </a:xfrm>
           <a:prstGeom prst="rect">
             <a:avLst/>
@@ -670,10 +628,8 @@
         <p:txBody>
           <a:bodyPr lIns="0" rIns="0" tIns="0" bIns="0" anchor="ctr"/>
           <a:p>
-            <a:endParaRPr b="0" lang="en-US" sz="1400" spc="-1" strike="noStrike">
-              <a:solidFill>
-                <a:srgbClr val="000000"/>
-              </a:solidFill>
+            <a:pPr algn="ctr"/>
+            <a:endParaRPr b="0" lang="en-US" sz="4400" spc="-1" strike="noStrike">
               <a:latin typeface="Arial"/>
             </a:endParaRPr>
           </a:p>
@@ -692,7 +648,7 @@
         <p:spPr>
           <a:xfrm>
             <a:off x="457200" y="1203480"/>
-            <a:ext cx="8228880" cy="2982600"/>
+            <a:ext cx="8229240" cy="2982960"/>
           </a:xfrm>
           <a:prstGeom prst="rect">
             <a:avLst/>
@@ -742,8 +698,8 @@
         </p:nvSpPr>
         <p:spPr>
           <a:xfrm>
-            <a:off x="311760" y="744480"/>
-            <a:ext cx="8519400" cy="2051640"/>
+            <a:off x="457200" y="205200"/>
+            <a:ext cx="8229240" cy="858600"/>
           </a:xfrm>
           <a:prstGeom prst="rect">
             <a:avLst/>
@@ -752,10 +708,8 @@
         <p:txBody>
           <a:bodyPr lIns="0" rIns="0" tIns="0" bIns="0" anchor="ctr"/>
           <a:p>
-            <a:endParaRPr b="0" lang="en-US" sz="1400" spc="-1" strike="noStrike">
-              <a:solidFill>
-                <a:srgbClr val="000000"/>
-              </a:solidFill>
+            <a:pPr algn="ctr"/>
+            <a:endParaRPr b="0" lang="en-US" sz="4400" spc="-1" strike="noStrike">
               <a:latin typeface="Arial"/>
             </a:endParaRPr>
           </a:p>
@@ -774,7 +728,7 @@
         <p:spPr>
           <a:xfrm>
             <a:off x="457200" y="1203480"/>
-            <a:ext cx="8228880" cy="2982600"/>
+            <a:ext cx="8229240" cy="2982960"/>
           </a:xfrm>
           <a:prstGeom prst="rect">
             <a:avLst/>
@@ -785,10 +739,7 @@
             <a:normAutofit/>
           </a:bodyPr>
           <a:p>
-            <a:endParaRPr b="0" lang="en-US" sz="1400" spc="-1" strike="noStrike">
-              <a:solidFill>
-                <a:srgbClr val="000000"/>
-              </a:solidFill>
+            <a:endParaRPr b="0" lang="en-US" sz="3200" spc="-1" strike="noStrike">
               <a:latin typeface="Arial"/>
             </a:endParaRPr>
           </a:p>
@@ -828,8 +779,8 @@
         </p:nvSpPr>
         <p:spPr>
           <a:xfrm>
-            <a:off x="311760" y="744480"/>
-            <a:ext cx="8519400" cy="2051640"/>
+            <a:off x="457200" y="205200"/>
+            <a:ext cx="8229240" cy="858600"/>
           </a:xfrm>
           <a:prstGeom prst="rect">
             <a:avLst/>
@@ -838,10 +789,8 @@
         <p:txBody>
           <a:bodyPr lIns="0" rIns="0" tIns="0" bIns="0" anchor="ctr"/>
           <a:p>
-            <a:endParaRPr b="0" lang="en-US" sz="1400" spc="-1" strike="noStrike">
-              <a:solidFill>
-                <a:srgbClr val="000000"/>
-              </a:solidFill>
+            <a:pPr algn="ctr"/>
+            <a:endParaRPr b="0" lang="en-US" sz="4400" spc="-1" strike="noStrike">
               <a:latin typeface="Arial"/>
             </a:endParaRPr>
           </a:p>
@@ -860,7 +809,7 @@
         <p:spPr>
           <a:xfrm>
             <a:off x="457200" y="1203480"/>
-            <a:ext cx="4015440" cy="2982600"/>
+            <a:ext cx="4015800" cy="2982960"/>
           </a:xfrm>
           <a:prstGeom prst="rect">
             <a:avLst/>
@@ -871,10 +820,7 @@
             <a:normAutofit/>
           </a:bodyPr>
           <a:p>
-            <a:endParaRPr b="0" lang="en-US" sz="1400" spc="-1" strike="noStrike">
-              <a:solidFill>
-                <a:srgbClr val="000000"/>
-              </a:solidFill>
+            <a:endParaRPr b="0" lang="en-US" sz="3200" spc="-1" strike="noStrike">
               <a:latin typeface="Arial"/>
             </a:endParaRPr>
           </a:p>
@@ -892,8 +838,8 @@
         </p:nvSpPr>
         <p:spPr>
           <a:xfrm>
-            <a:off x="4673880" y="1203480"/>
-            <a:ext cx="4015440" cy="2982600"/>
+            <a:off x="4674240" y="1203480"/>
+            <a:ext cx="4015800" cy="2982960"/>
           </a:xfrm>
           <a:prstGeom prst="rect">
             <a:avLst/>
@@ -904,10 +850,7 @@
             <a:normAutofit/>
           </a:bodyPr>
           <a:p>
-            <a:endParaRPr b="0" lang="en-US" sz="1400" spc="-1" strike="noStrike">
-              <a:solidFill>
-                <a:srgbClr val="000000"/>
-              </a:solidFill>
+            <a:endParaRPr b="0" lang="en-US" sz="3200" spc="-1" strike="noStrike">
               <a:latin typeface="Arial"/>
             </a:endParaRPr>
           </a:p>
@@ -947,8 +890,8 @@
         </p:nvSpPr>
         <p:spPr>
           <a:xfrm>
-            <a:off x="311760" y="744480"/>
-            <a:ext cx="8519400" cy="2051640"/>
+            <a:off x="457200" y="205200"/>
+            <a:ext cx="8229240" cy="858600"/>
           </a:xfrm>
           <a:prstGeom prst="rect">
             <a:avLst/>
@@ -957,10 +900,8 @@
         <p:txBody>
           <a:bodyPr lIns="0" rIns="0" tIns="0" bIns="0" anchor="ctr"/>
           <a:p>
-            <a:endParaRPr b="0" lang="en-US" sz="1400" spc="-1" strike="noStrike">
-              <a:solidFill>
-                <a:srgbClr val="000000"/>
-              </a:solidFill>
+            <a:pPr algn="ctr"/>
+            <a:endParaRPr b="0" lang="en-US" sz="4400" spc="-1" strike="noStrike">
               <a:latin typeface="Arial"/>
             </a:endParaRPr>
           </a:p>
@@ -1000,8 +941,8 @@
         </p:nvSpPr>
         <p:spPr>
           <a:xfrm>
-            <a:off x="311760" y="744480"/>
-            <a:ext cx="8519400" cy="9511560"/>
+            <a:off x="457200" y="205200"/>
+            <a:ext cx="8229240" cy="3981240"/>
           </a:xfrm>
           <a:prstGeom prst="rect">
             <a:avLst/>
@@ -1051,8 +992,8 @@
         </p:nvSpPr>
         <p:spPr>
           <a:xfrm>
-            <a:off x="311760" y="744480"/>
-            <a:ext cx="8519400" cy="2051640"/>
+            <a:off x="457200" y="205200"/>
+            <a:ext cx="8229240" cy="858600"/>
           </a:xfrm>
           <a:prstGeom prst="rect">
             <a:avLst/>
@@ -1061,10 +1002,8 @@
         <p:txBody>
           <a:bodyPr lIns="0" rIns="0" tIns="0" bIns="0" anchor="ctr"/>
           <a:p>
-            <a:endParaRPr b="0" lang="en-US" sz="1400" spc="-1" strike="noStrike">
-              <a:solidFill>
-                <a:srgbClr val="000000"/>
-              </a:solidFill>
+            <a:pPr algn="ctr"/>
+            <a:endParaRPr b="0" lang="en-US" sz="4400" spc="-1" strike="noStrike">
               <a:latin typeface="Arial"/>
             </a:endParaRPr>
           </a:p>
@@ -1083,7 +1022,7 @@
         <p:spPr>
           <a:xfrm>
             <a:off x="457200" y="1203480"/>
-            <a:ext cx="4015440" cy="1422360"/>
+            <a:ext cx="4015800" cy="1422720"/>
           </a:xfrm>
           <a:prstGeom prst="rect">
             <a:avLst/>
@@ -1094,10 +1033,7 @@
             <a:normAutofit/>
           </a:bodyPr>
           <a:p>
-            <a:endParaRPr b="0" lang="en-US" sz="1400" spc="-1" strike="noStrike">
-              <a:solidFill>
-                <a:srgbClr val="000000"/>
-              </a:solidFill>
+            <a:endParaRPr b="0" lang="en-US" sz="3200" spc="-1" strike="noStrike">
               <a:latin typeface="Arial"/>
             </a:endParaRPr>
           </a:p>
@@ -1115,8 +1051,8 @@
         </p:nvSpPr>
         <p:spPr>
           <a:xfrm>
-            <a:off x="4673880" y="1203480"/>
-            <a:ext cx="4015440" cy="2982600"/>
+            <a:off x="4674240" y="1203480"/>
+            <a:ext cx="4015800" cy="2982960"/>
           </a:xfrm>
           <a:prstGeom prst="rect">
             <a:avLst/>
@@ -1127,10 +1063,7 @@
             <a:normAutofit/>
           </a:bodyPr>
           <a:p>
-            <a:endParaRPr b="0" lang="en-US" sz="1400" spc="-1" strike="noStrike">
-              <a:solidFill>
-                <a:srgbClr val="000000"/>
-              </a:solidFill>
+            <a:endParaRPr b="0" lang="en-US" sz="3200" spc="-1" strike="noStrike">
               <a:latin typeface="Arial"/>
             </a:endParaRPr>
           </a:p>
@@ -1148,8 +1081,8 @@
         </p:nvSpPr>
         <p:spPr>
           <a:xfrm>
-            <a:off x="457200" y="2761200"/>
-            <a:ext cx="4015440" cy="1422360"/>
+            <a:off x="457200" y="2761920"/>
+            <a:ext cx="4015800" cy="1422720"/>
           </a:xfrm>
           <a:prstGeom prst="rect">
             <a:avLst/>
@@ -1160,10 +1093,7 @@
             <a:normAutofit/>
           </a:bodyPr>
           <a:p>
-            <a:endParaRPr b="0" lang="en-US" sz="1400" spc="-1" strike="noStrike">
-              <a:solidFill>
-                <a:srgbClr val="000000"/>
-              </a:solidFill>
+            <a:endParaRPr b="0" lang="en-US" sz="3200" spc="-1" strike="noStrike">
               <a:latin typeface="Arial"/>
             </a:endParaRPr>
           </a:p>
@@ -1203,8 +1133,8 @@
         </p:nvSpPr>
         <p:spPr>
           <a:xfrm>
-            <a:off x="311760" y="744480"/>
-            <a:ext cx="8519400" cy="2051640"/>
+            <a:off x="457200" y="205200"/>
+            <a:ext cx="8229240" cy="858600"/>
           </a:xfrm>
           <a:prstGeom prst="rect">
             <a:avLst/>
@@ -1213,10 +1143,8 @@
         <p:txBody>
           <a:bodyPr lIns="0" rIns="0" tIns="0" bIns="0" anchor="ctr"/>
           <a:p>
-            <a:endParaRPr b="0" lang="en-US" sz="1400" spc="-1" strike="noStrike">
-              <a:solidFill>
-                <a:srgbClr val="000000"/>
-              </a:solidFill>
+            <a:pPr algn="ctr"/>
+            <a:endParaRPr b="0" lang="en-US" sz="4400" spc="-1" strike="noStrike">
               <a:latin typeface="Arial"/>
             </a:endParaRPr>
           </a:p>
@@ -1235,7 +1163,7 @@
         <p:spPr>
           <a:xfrm>
             <a:off x="457200" y="1203480"/>
-            <a:ext cx="4015440" cy="2982600"/>
+            <a:ext cx="4015800" cy="2982960"/>
           </a:xfrm>
           <a:prstGeom prst="rect">
             <a:avLst/>
@@ -1246,10 +1174,7 @@
             <a:normAutofit/>
           </a:bodyPr>
           <a:p>
-            <a:endParaRPr b="0" lang="en-US" sz="1400" spc="-1" strike="noStrike">
-              <a:solidFill>
-                <a:srgbClr val="000000"/>
-              </a:solidFill>
+            <a:endParaRPr b="0" lang="en-US" sz="3200" spc="-1" strike="noStrike">
               <a:latin typeface="Arial"/>
             </a:endParaRPr>
           </a:p>
@@ -1267,8 +1192,8 @@
         </p:nvSpPr>
         <p:spPr>
           <a:xfrm>
-            <a:off x="4673880" y="1203480"/>
-            <a:ext cx="4015440" cy="1422360"/>
+            <a:off x="4674240" y="1203480"/>
+            <a:ext cx="4015800" cy="1422720"/>
           </a:xfrm>
           <a:prstGeom prst="rect">
             <a:avLst/>
@@ -1279,10 +1204,7 @@
             <a:normAutofit/>
           </a:bodyPr>
           <a:p>
-            <a:endParaRPr b="0" lang="en-US" sz="1400" spc="-1" strike="noStrike">
-              <a:solidFill>
-                <a:srgbClr val="000000"/>
-              </a:solidFill>
+            <a:endParaRPr b="0" lang="en-US" sz="3200" spc="-1" strike="noStrike">
               <a:latin typeface="Arial"/>
             </a:endParaRPr>
           </a:p>
@@ -1300,8 +1222,8 @@
         </p:nvSpPr>
         <p:spPr>
           <a:xfrm>
-            <a:off x="4673880" y="2761200"/>
-            <a:ext cx="4015440" cy="1422360"/>
+            <a:off x="4674240" y="2761920"/>
+            <a:ext cx="4015800" cy="1422720"/>
           </a:xfrm>
           <a:prstGeom prst="rect">
             <a:avLst/>
@@ -1312,10 +1234,7 @@
             <a:normAutofit/>
           </a:bodyPr>
           <a:p>
-            <a:endParaRPr b="0" lang="en-US" sz="1400" spc="-1" strike="noStrike">
-              <a:solidFill>
-                <a:srgbClr val="000000"/>
-              </a:solidFill>
+            <a:endParaRPr b="0" lang="en-US" sz="3200" spc="-1" strike="noStrike">
               <a:latin typeface="Arial"/>
             </a:endParaRPr>
           </a:p>
@@ -1355,8 +1274,8 @@
         </p:nvSpPr>
         <p:spPr>
           <a:xfrm>
-            <a:off x="311760" y="744480"/>
-            <a:ext cx="8519400" cy="2051640"/>
+            <a:off x="457200" y="205200"/>
+            <a:ext cx="8229240" cy="858600"/>
           </a:xfrm>
           <a:prstGeom prst="rect">
             <a:avLst/>
@@ -1365,10 +1284,8 @@
         <p:txBody>
           <a:bodyPr lIns="0" rIns="0" tIns="0" bIns="0" anchor="ctr"/>
           <a:p>
-            <a:endParaRPr b="0" lang="en-US" sz="1400" spc="-1" strike="noStrike">
-              <a:solidFill>
-                <a:srgbClr val="000000"/>
-              </a:solidFill>
+            <a:pPr algn="ctr"/>
+            <a:endParaRPr b="0" lang="en-US" sz="4400" spc="-1" strike="noStrike">
               <a:latin typeface="Arial"/>
             </a:endParaRPr>
           </a:p>
@@ -1387,7 +1304,7 @@
         <p:spPr>
           <a:xfrm>
             <a:off x="457200" y="1203480"/>
-            <a:ext cx="4015440" cy="1422360"/>
+            <a:ext cx="4015800" cy="1422720"/>
           </a:xfrm>
           <a:prstGeom prst="rect">
             <a:avLst/>
@@ -1398,10 +1315,7 @@
             <a:normAutofit/>
           </a:bodyPr>
           <a:p>
-            <a:endParaRPr b="0" lang="en-US" sz="1400" spc="-1" strike="noStrike">
-              <a:solidFill>
-                <a:srgbClr val="000000"/>
-              </a:solidFill>
+            <a:endParaRPr b="0" lang="en-US" sz="3200" spc="-1" strike="noStrike">
               <a:latin typeface="Arial"/>
             </a:endParaRPr>
           </a:p>
@@ -1419,8 +1333,8 @@
         </p:nvSpPr>
         <p:spPr>
           <a:xfrm>
-            <a:off x="4673880" y="1203480"/>
-            <a:ext cx="4015440" cy="1422360"/>
+            <a:off x="4674240" y="1203480"/>
+            <a:ext cx="4015800" cy="1422720"/>
           </a:xfrm>
           <a:prstGeom prst="rect">
             <a:avLst/>
@@ -1431,10 +1345,7 @@
             <a:normAutofit/>
           </a:bodyPr>
           <a:p>
-            <a:endParaRPr b="0" lang="en-US" sz="1400" spc="-1" strike="noStrike">
-              <a:solidFill>
-                <a:srgbClr val="000000"/>
-              </a:solidFill>
+            <a:endParaRPr b="0" lang="en-US" sz="3200" spc="-1" strike="noStrike">
               <a:latin typeface="Arial"/>
             </a:endParaRPr>
           </a:p>
@@ -1452,8 +1363,8 @@
         </p:nvSpPr>
         <p:spPr>
           <a:xfrm>
-            <a:off x="457200" y="2761200"/>
-            <a:ext cx="8228880" cy="1422360"/>
+            <a:off x="457200" y="2761920"/>
+            <a:ext cx="8229240" cy="1422720"/>
           </a:xfrm>
           <a:prstGeom prst="rect">
             <a:avLst/>
@@ -1464,10 +1375,7 @@
             <a:normAutofit/>
           </a:bodyPr>
           <a:p>
-            <a:endParaRPr b="0" lang="en-US" sz="1400" spc="-1" strike="noStrike">
-              <a:solidFill>
-                <a:srgbClr val="000000"/>
-              </a:solidFill>
+            <a:endParaRPr b="0" lang="en-US" sz="3200" spc="-1" strike="noStrike">
               <a:latin typeface="Arial"/>
             </a:endParaRPr>
           </a:p>
@@ -1514,8 +1422,8 @@
         </p:nvSpPr>
         <p:spPr>
           <a:xfrm>
-            <a:off x="311760" y="744480"/>
-            <a:ext cx="8519400" cy="2051640"/>
+            <a:off x="457200" y="205200"/>
+            <a:ext cx="8229240" cy="858600"/>
           </a:xfrm>
           <a:prstGeom prst="rect">
             <a:avLst/>
@@ -1524,19 +1432,14 @@
         <p:txBody>
           <a:bodyPr lIns="0" rIns="0" tIns="0" bIns="0" anchor="ctr"/>
           <a:p>
-            <a:r>
-              <a:rPr b="0" lang="en-US" sz="1800" spc="-1" strike="noStrike">
-                <a:solidFill>
-                  <a:srgbClr val="000000"/>
-                </a:solidFill>
+            <a:pPr algn="ctr"/>
+            <a:r>
+              <a:rPr b="0" lang="en-US" sz="4400" spc="-1" strike="noStrike">
                 <a:latin typeface="Arial"/>
               </a:rPr>
               <a:t>Click to edit the title text format</a:t>
             </a:r>
-            <a:endParaRPr b="0" lang="en-US" sz="1800" spc="-1" strike="noStrike">
-              <a:solidFill>
-                <a:srgbClr val="000000"/>
-              </a:solidFill>
+            <a:endParaRPr b="0" lang="en-US" sz="4400" spc="-1" strike="noStrike">
               <a:latin typeface="Arial"/>
             </a:endParaRPr>
           </a:p>
@@ -1555,7 +1458,7 @@
         <p:spPr>
           <a:xfrm>
             <a:off x="457200" y="1203480"/>
-            <a:ext cx="8228880" cy="2982600"/>
+            <a:ext cx="8229240" cy="2982960"/>
           </a:xfrm>
           <a:prstGeom prst="rect">
             <a:avLst/>
@@ -1578,18 +1481,12 @@
               <a:buChar char=""/>
             </a:pPr>
             <a:r>
-              <a:rPr b="0" lang="en-US" sz="1800" spc="-1" strike="noStrike">
-                <a:solidFill>
-                  <a:srgbClr val="000000"/>
-                </a:solidFill>
+              <a:rPr b="0" lang="en-US" sz="3200" spc="-1" strike="noStrike">
                 <a:latin typeface="Arial"/>
               </a:rPr>
               <a:t>Click to edit the outline text format</a:t>
             </a:r>
-            <a:endParaRPr b="0" lang="en-US" sz="1800" spc="-1" strike="noStrike">
-              <a:solidFill>
-                <a:srgbClr val="000000"/>
-              </a:solidFill>
+            <a:endParaRPr b="0" lang="en-US" sz="3200" spc="-1" strike="noStrike">
               <a:latin typeface="Arial"/>
             </a:endParaRPr>
           </a:p>
@@ -1606,18 +1503,12 @@
               <a:buChar char=""/>
             </a:pPr>
             <a:r>
-              <a:rPr b="0" lang="en-US" sz="1800" spc="-1" strike="noStrike">
-                <a:solidFill>
-                  <a:srgbClr val="000000"/>
-                </a:solidFill>
+              <a:rPr b="0" lang="en-US" sz="2800" spc="-1" strike="noStrike">
                 <a:latin typeface="Arial"/>
               </a:rPr>
               <a:t>Second Outline Level</a:t>
             </a:r>
-            <a:endParaRPr b="0" lang="en-US" sz="1800" spc="-1" strike="noStrike">
-              <a:solidFill>
-                <a:srgbClr val="000000"/>
-              </a:solidFill>
+            <a:endParaRPr b="0" lang="en-US" sz="2800" spc="-1" strike="noStrike">
               <a:latin typeface="Arial"/>
             </a:endParaRPr>
           </a:p>
@@ -1634,18 +1525,12 @@
               <a:buChar char=""/>
             </a:pPr>
             <a:r>
-              <a:rPr b="0" lang="en-US" sz="1800" spc="-1" strike="noStrike">
-                <a:solidFill>
-                  <a:srgbClr val="000000"/>
-                </a:solidFill>
+              <a:rPr b="0" lang="en-US" sz="2400" spc="-1" strike="noStrike">
                 <a:latin typeface="Arial"/>
               </a:rPr>
               <a:t>Third Outline Level</a:t>
             </a:r>
-            <a:endParaRPr b="0" lang="en-US" sz="1800" spc="-1" strike="noStrike">
-              <a:solidFill>
-                <a:srgbClr val="000000"/>
-              </a:solidFill>
+            <a:endParaRPr b="0" lang="en-US" sz="2400" spc="-1" strike="noStrike">
               <a:latin typeface="Arial"/>
             </a:endParaRPr>
           </a:p>
@@ -1662,18 +1547,12 @@
               <a:buChar char=""/>
             </a:pPr>
             <a:r>
-              <a:rPr b="0" lang="en-US" sz="1800" spc="-1" strike="noStrike">
-                <a:solidFill>
-                  <a:srgbClr val="000000"/>
-                </a:solidFill>
+              <a:rPr b="0" lang="en-US" sz="2000" spc="-1" strike="noStrike">
                 <a:latin typeface="Arial"/>
               </a:rPr>
               <a:t>Fourth Outline Level</a:t>
             </a:r>
-            <a:endParaRPr b="0" lang="en-US" sz="1800" spc="-1" strike="noStrike">
-              <a:solidFill>
-                <a:srgbClr val="000000"/>
-              </a:solidFill>
+            <a:endParaRPr b="0" lang="en-US" sz="2000" spc="-1" strike="noStrike">
               <a:latin typeface="Arial"/>
             </a:endParaRPr>
           </a:p>
@@ -1690,18 +1569,12 @@
               <a:buChar char=""/>
             </a:pPr>
             <a:r>
-              <a:rPr b="0" lang="en-US" sz="1800" spc="-1" strike="noStrike">
-                <a:solidFill>
-                  <a:srgbClr val="000000"/>
-                </a:solidFill>
+              <a:rPr b="0" lang="en-US" sz="2000" spc="-1" strike="noStrike">
                 <a:latin typeface="Arial"/>
               </a:rPr>
               <a:t>Fifth Outline Level</a:t>
             </a:r>
-            <a:endParaRPr b="0" lang="en-US" sz="1800" spc="-1" strike="noStrike">
-              <a:solidFill>
-                <a:srgbClr val="000000"/>
-              </a:solidFill>
+            <a:endParaRPr b="0" lang="en-US" sz="2000" spc="-1" strike="noStrike">
               <a:latin typeface="Arial"/>
             </a:endParaRPr>
           </a:p>
@@ -1718,18 +1591,12 @@
               <a:buChar char=""/>
             </a:pPr>
             <a:r>
-              <a:rPr b="0" lang="en-US" sz="1800" spc="-1" strike="noStrike">
-                <a:solidFill>
-                  <a:srgbClr val="000000"/>
-                </a:solidFill>
+              <a:rPr b="0" lang="en-US" sz="2000" spc="-1" strike="noStrike">
                 <a:latin typeface="Arial"/>
               </a:rPr>
               <a:t>Sixth Outline Level</a:t>
             </a:r>
-            <a:endParaRPr b="0" lang="en-US" sz="1800" spc="-1" strike="noStrike">
-              <a:solidFill>
-                <a:srgbClr val="000000"/>
-              </a:solidFill>
+            <a:endParaRPr b="0" lang="en-US" sz="2000" spc="-1" strike="noStrike">
               <a:latin typeface="Arial"/>
             </a:endParaRPr>
           </a:p>
@@ -1746,18 +1613,12 @@
               <a:buChar char=""/>
             </a:pPr>
             <a:r>
-              <a:rPr b="0" lang="en-US" sz="1800" spc="-1" strike="noStrike">
-                <a:solidFill>
-                  <a:srgbClr val="000000"/>
-                </a:solidFill>
+              <a:rPr b="0" lang="en-US" sz="2000" spc="-1" strike="noStrike">
                 <a:latin typeface="Arial"/>
               </a:rPr>
               <a:t>Seventh Outline Level</a:t>
             </a:r>
-            <a:endParaRPr b="0" lang="en-US" sz="1800" spc="-1" strike="noStrike">
-              <a:solidFill>
-                <a:srgbClr val="000000"/>
-              </a:solidFill>
+            <a:endParaRPr b="0" lang="en-US" sz="2000" spc="-1" strike="noStrike">
               <a:latin typeface="Arial"/>
             </a:endParaRPr>
           </a:p>
@@ -1809,7 +1670,7 @@
         <p:spPr>
           <a:xfrm>
             <a:off x="311760" y="3094560"/>
-            <a:ext cx="8519400" cy="1644120"/>
+            <a:ext cx="8519040" cy="1643760"/>
           </a:xfrm>
           <a:prstGeom prst="rect">
             <a:avLst/>
@@ -1888,7 +1749,7 @@
         <p:spPr>
           <a:xfrm>
             <a:off x="2103120" y="1811880"/>
-            <a:ext cx="4937400" cy="1519920"/>
+            <a:ext cx="4937040" cy="1519560"/>
           </a:xfrm>
           <a:prstGeom prst="rect">
             <a:avLst/>
@@ -2097,7 +1958,7 @@
         <p:spPr>
           <a:xfrm>
             <a:off x="117360" y="91440"/>
-            <a:ext cx="8889120" cy="4986000"/>
+            <a:ext cx="8888760" cy="4985640"/>
           </a:xfrm>
           <a:prstGeom prst="rect">
             <a:avLst/>
@@ -2185,7 +2046,7 @@
             </a:endParaRPr>
           </a:p>
           <a:p>
-            <a:pPr marL="457200" indent="-316440">
+            <a:pPr marL="457200" indent="-316080">
               <a:lnSpc>
                 <a:spcPct val="115000"/>
               </a:lnSpc>
@@ -2213,7 +2074,7 @@
             </a:endParaRPr>
           </a:p>
           <a:p>
-            <a:pPr marL="457200" indent="-316440">
+            <a:pPr marL="457200" indent="-316080">
               <a:lnSpc>
                 <a:spcPct val="115000"/>
               </a:lnSpc>
@@ -2238,7 +2099,7 @@
             </a:endParaRPr>
           </a:p>
           <a:p>
-            <a:pPr marL="457200" indent="-316440">
+            <a:pPr marL="457200" indent="-316080">
               <a:lnSpc>
                 <a:spcPct val="115000"/>
               </a:lnSpc>
@@ -2263,7 +2124,7 @@
             </a:endParaRPr>
           </a:p>
           <a:p>
-            <a:pPr marL="457200" indent="-316440">
+            <a:pPr marL="457200" indent="-316080">
               <a:lnSpc>
                 <a:spcPct val="115000"/>
               </a:lnSpc>
@@ -2288,7 +2149,7 @@
             </a:endParaRPr>
           </a:p>
           <a:p>
-            <a:pPr marL="457200" indent="-227520">
+            <a:pPr marL="457200" indent="-227160">
               <a:lnSpc>
                 <a:spcPct val="115000"/>
               </a:lnSpc>
@@ -2298,7 +2159,7 @@
             </a:endParaRPr>
           </a:p>
           <a:p>
-            <a:pPr>
+            <a:pPr marL="457200" indent="-227160">
               <a:lnSpc>
                 <a:spcPct val="7000"/>
               </a:lnSpc>
@@ -2321,7 +2182,7 @@
             </a:endParaRPr>
           </a:p>
           <a:p>
-            <a:pPr marL="457200" indent="-316440">
+            <a:pPr marL="457200" indent="-316080">
               <a:lnSpc>
                 <a:spcPct val="115000"/>
               </a:lnSpc>
@@ -2349,7 +2210,7 @@
             </a:endParaRPr>
           </a:p>
           <a:p>
-            <a:pPr marL="457200" indent="-316440">
+            <a:pPr marL="457200" indent="-316080">
               <a:lnSpc>
                 <a:spcPct val="115000"/>
               </a:lnSpc>
@@ -2374,7 +2235,7 @@
             </a:endParaRPr>
           </a:p>
           <a:p>
-            <a:pPr marL="457200" indent="-316440">
+            <a:pPr marL="457200" indent="-316080">
               <a:lnSpc>
                 <a:spcPct val="115000"/>
               </a:lnSpc>
@@ -2399,7 +2260,7 @@
             </a:endParaRPr>
           </a:p>
           <a:p>
-            <a:pPr marL="457200" indent="-316440">
+            <a:pPr marL="457200" indent="-316080">
               <a:lnSpc>
                 <a:spcPct val="115000"/>
               </a:lnSpc>
@@ -2473,7 +2334,7 @@
         <p:spPr>
           <a:xfrm>
             <a:off x="117360" y="0"/>
-            <a:ext cx="2792520" cy="573480"/>
+            <a:ext cx="2792160" cy="573120"/>
           </a:xfrm>
           <a:prstGeom prst="rect">
             <a:avLst/>
@@ -2582,7 +2443,7 @@
         <p:spPr>
           <a:xfrm>
             <a:off x="117360" y="91440"/>
-            <a:ext cx="8889120" cy="4986000"/>
+            <a:ext cx="8888760" cy="4985640"/>
           </a:xfrm>
           <a:prstGeom prst="rect">
             <a:avLst/>
@@ -2670,7 +2531,7 @@
             </a:endParaRPr>
           </a:p>
           <a:p>
-            <a:pPr marL="457200" indent="-316440">
+            <a:pPr marL="457200" indent="-316080">
               <a:lnSpc>
                 <a:spcPct val="115000"/>
               </a:lnSpc>
@@ -2698,7 +2559,7 @@
             </a:endParaRPr>
           </a:p>
           <a:p>
-            <a:pPr marL="457200" indent="-316440">
+            <a:pPr marL="457200" indent="-316080">
               <a:lnSpc>
                 <a:spcPct val="115000"/>
               </a:lnSpc>
@@ -2723,7 +2584,7 @@
             </a:endParaRPr>
           </a:p>
           <a:p>
-            <a:pPr marL="457200" indent="-316440">
+            <a:pPr marL="457200" indent="-316080">
               <a:lnSpc>
                 <a:spcPct val="115000"/>
               </a:lnSpc>
@@ -2748,7 +2609,7 @@
             </a:endParaRPr>
           </a:p>
           <a:p>
-            <a:pPr marL="457200" indent="-227520">
+            <a:pPr marL="457200" indent="-227160">
               <a:lnSpc>
                 <a:spcPct val="115000"/>
               </a:lnSpc>
@@ -2758,7 +2619,7 @@
             </a:endParaRPr>
           </a:p>
           <a:p>
-            <a:pPr>
+            <a:pPr marL="457200" indent="-227160">
               <a:lnSpc>
                 <a:spcPct val="7000"/>
               </a:lnSpc>
@@ -2781,7 +2642,7 @@
             </a:endParaRPr>
           </a:p>
           <a:p>
-            <a:pPr marL="457200" indent="-316440">
+            <a:pPr marL="457200" indent="-316080">
               <a:lnSpc>
                 <a:spcPct val="115000"/>
               </a:lnSpc>
@@ -2809,7 +2670,7 @@
             </a:endParaRPr>
           </a:p>
           <a:p>
-            <a:pPr marL="457200" indent="-316440">
+            <a:pPr marL="457200" indent="-316080">
               <a:lnSpc>
                 <a:spcPct val="115000"/>
               </a:lnSpc>
@@ -2834,7 +2695,7 @@
             </a:endParaRPr>
           </a:p>
           <a:p>
-            <a:pPr marL="457200" indent="-316440">
+            <a:pPr marL="457200" indent="-316080">
               <a:lnSpc>
                 <a:spcPct val="115000"/>
               </a:lnSpc>
@@ -2921,7 +2782,7 @@
         <p:spPr>
           <a:xfrm>
             <a:off x="117360" y="-18360"/>
-            <a:ext cx="2792520" cy="573480"/>
+            <a:ext cx="2792160" cy="573120"/>
           </a:xfrm>
           <a:prstGeom prst="rect">
             <a:avLst/>
@@ -3020,7 +2881,7 @@
         <p:spPr>
           <a:xfrm>
             <a:off x="117360" y="91440"/>
-            <a:ext cx="8889120" cy="4986000"/>
+            <a:ext cx="8888760" cy="4985640"/>
           </a:xfrm>
           <a:prstGeom prst="rect">
             <a:avLst/>
@@ -3046,7 +2907,7 @@
         <p:spPr>
           <a:xfrm>
             <a:off x="210960" y="69480"/>
-            <a:ext cx="2792520" cy="573480"/>
+            <a:ext cx="2792160" cy="573120"/>
           </a:xfrm>
           <a:prstGeom prst="rect">
             <a:avLst/>
@@ -3100,7 +2961,7 @@
         <p:spPr>
           <a:xfrm>
             <a:off x="811440" y="674640"/>
-            <a:ext cx="8282160" cy="4437360"/>
+            <a:ext cx="8281800" cy="4437000"/>
           </a:xfrm>
           <a:prstGeom prst="rect">
             <a:avLst/>
@@ -3168,7 +3029,7 @@
         <p:spPr>
           <a:xfrm>
             <a:off x="117360" y="91440"/>
-            <a:ext cx="8889120" cy="4986000"/>
+            <a:ext cx="8888760" cy="4985640"/>
           </a:xfrm>
           <a:prstGeom prst="rect">
             <a:avLst/>
@@ -3194,7 +3055,7 @@
         <p:spPr>
           <a:xfrm>
             <a:off x="210960" y="69480"/>
-            <a:ext cx="2792520" cy="573480"/>
+            <a:ext cx="2792160" cy="573120"/>
           </a:xfrm>
           <a:prstGeom prst="rect">
             <a:avLst/>
@@ -3248,7 +3109,7 @@
         <p:spPr>
           <a:xfrm>
             <a:off x="1332720" y="567720"/>
-            <a:ext cx="7822080" cy="4767120"/>
+            <a:ext cx="7821720" cy="4766760"/>
           </a:xfrm>
           <a:prstGeom prst="rect">
             <a:avLst/>
@@ -3316,7 +3177,7 @@
         <p:spPr>
           <a:xfrm>
             <a:off x="117360" y="91440"/>
-            <a:ext cx="8889120" cy="4986000"/>
+            <a:ext cx="8888760" cy="4985640"/>
           </a:xfrm>
           <a:prstGeom prst="rect">
             <a:avLst/>
@@ -3342,7 +3203,7 @@
         <p:spPr>
           <a:xfrm>
             <a:off x="210960" y="69480"/>
-            <a:ext cx="2792520" cy="573480"/>
+            <a:ext cx="2792160" cy="573120"/>
           </a:xfrm>
           <a:prstGeom prst="rect">
             <a:avLst/>
@@ -3396,7 +3257,7 @@
         <p:spPr>
           <a:xfrm>
             <a:off x="1235160" y="666720"/>
-            <a:ext cx="7847640" cy="4452840"/>
+            <a:ext cx="7847280" cy="4452480"/>
           </a:xfrm>
           <a:prstGeom prst="rect">
             <a:avLst/>
@@ -3464,7 +3325,7 @@
         <p:spPr>
           <a:xfrm>
             <a:off x="117360" y="91440"/>
-            <a:ext cx="8889120" cy="4986000"/>
+            <a:ext cx="8888760" cy="4985640"/>
           </a:xfrm>
           <a:prstGeom prst="rect">
             <a:avLst/>
@@ -3490,7 +3351,7 @@
         <p:spPr>
           <a:xfrm>
             <a:off x="210960" y="69480"/>
-            <a:ext cx="2792520" cy="573480"/>
+            <a:ext cx="2792160" cy="573120"/>
           </a:xfrm>
           <a:prstGeom prst="rect">
             <a:avLst/>
@@ -3544,7 +3405,7 @@
         <p:spPr>
           <a:xfrm>
             <a:off x="1380960" y="588960"/>
-            <a:ext cx="7752600" cy="4582800"/>
+            <a:ext cx="7752240" cy="4582440"/>
           </a:xfrm>
           <a:prstGeom prst="rect">
             <a:avLst/>
@@ -3612,7 +3473,7 @@
         <p:spPr>
           <a:xfrm>
             <a:off x="117360" y="91440"/>
-            <a:ext cx="8889120" cy="4986000"/>
+            <a:ext cx="8888760" cy="4985640"/>
           </a:xfrm>
           <a:prstGeom prst="rect">
             <a:avLst/>
@@ -3638,7 +3499,7 @@
         <p:spPr>
           <a:xfrm>
             <a:off x="210960" y="69480"/>
-            <a:ext cx="2792520" cy="573480"/>
+            <a:ext cx="2792160" cy="573120"/>
           </a:xfrm>
           <a:prstGeom prst="rect">
             <a:avLst/>
@@ -3692,7 +3553,7 @@
         <p:spPr>
           <a:xfrm>
             <a:off x="1162080" y="648360"/>
-            <a:ext cx="7975080" cy="4481280"/>
+            <a:ext cx="7974720" cy="4480920"/>
           </a:xfrm>
           <a:prstGeom prst="rect">
             <a:avLst/>
@@ -3760,7 +3621,7 @@
         <p:spPr>
           <a:xfrm>
             <a:off x="117360" y="91440"/>
-            <a:ext cx="8889120" cy="4986000"/>
+            <a:ext cx="8888760" cy="4985640"/>
           </a:xfrm>
           <a:prstGeom prst="rect">
             <a:avLst/>
@@ -3786,7 +3647,7 @@
         <p:spPr>
           <a:xfrm>
             <a:off x="210960" y="69480"/>
-            <a:ext cx="2792520" cy="573480"/>
+            <a:ext cx="2792160" cy="573120"/>
           </a:xfrm>
           <a:prstGeom prst="rect">
             <a:avLst/>
@@ -3840,7 +3701,7 @@
         <p:spPr>
           <a:xfrm>
             <a:off x="452520" y="763560"/>
-            <a:ext cx="8238960" cy="3616560"/>
+            <a:ext cx="8238600" cy="3616200"/>
           </a:xfrm>
           <a:prstGeom prst="rect">
             <a:avLst/>
@@ -3908,7 +3769,7 @@
         <p:spPr>
           <a:xfrm>
             <a:off x="117360" y="91440"/>
-            <a:ext cx="8889120" cy="4986000"/>
+            <a:ext cx="8888760" cy="4985640"/>
           </a:xfrm>
           <a:prstGeom prst="rect">
             <a:avLst/>
@@ -3934,7 +3795,7 @@
         <p:spPr>
           <a:xfrm>
             <a:off x="210960" y="69480"/>
-            <a:ext cx="8733600" cy="4838400"/>
+            <a:ext cx="8733240" cy="4838040"/>
           </a:xfrm>
           <a:prstGeom prst="rect">
             <a:avLst/>
@@ -3984,7 +3845,7 @@
             </a:endParaRPr>
           </a:p>
           <a:p>
-            <a:pPr marL="457200" indent="-316440">
+            <a:pPr marL="457200" indent="-316080">
               <a:lnSpc>
                 <a:spcPct val="100000"/>
               </a:lnSpc>
@@ -4019,7 +3880,7 @@
             </a:endParaRPr>
           </a:p>
           <a:p>
-            <a:pPr marL="457200" indent="-316440">
+            <a:pPr marL="457200" indent="-316080">
               <a:lnSpc>
                 <a:spcPct val="100000"/>
               </a:lnSpc>
@@ -4044,17 +3905,17 @@
             </a:endParaRPr>
           </a:p>
           <a:p>
-            <a:pPr marL="457200" indent="-227520">
-              <a:lnSpc>
-                <a:spcPct val="100000"/>
-              </a:lnSpc>
-            </a:pPr>
-            <a:endParaRPr b="0" lang="en-US" sz="1400" spc="-1" strike="noStrike">
-              <a:latin typeface="Arial"/>
-            </a:endParaRPr>
-          </a:p>
-          <a:p>
-            <a:pPr marL="457200" indent="-316440">
+            <a:pPr marL="457200" indent="-227160">
+              <a:lnSpc>
+                <a:spcPct val="100000"/>
+              </a:lnSpc>
+            </a:pPr>
+            <a:endParaRPr b="0" lang="en-US" sz="1400" spc="-1" strike="noStrike">
+              <a:latin typeface="Arial"/>
+            </a:endParaRPr>
+          </a:p>
+          <a:p>
+            <a:pPr marL="457200" indent="-316080">
               <a:lnSpc>
                 <a:spcPct val="100000"/>
               </a:lnSpc>
@@ -4089,7 +3950,7 @@
             </a:endParaRPr>
           </a:p>
           <a:p>
-            <a:pPr marL="457200" indent="-316440">
+            <a:pPr marL="457200" indent="-316080">
               <a:lnSpc>
                 <a:spcPct val="100000"/>
               </a:lnSpc>
@@ -4124,7 +3985,7 @@
             </a:endParaRPr>
           </a:p>
           <a:p>
-            <a:pPr marL="457200" indent="-316440">
+            <a:pPr marL="457200" indent="-316080">
               <a:lnSpc>
                 <a:spcPct val="100000"/>
               </a:lnSpc>
@@ -4159,7 +4020,7 @@
             </a:endParaRPr>
           </a:p>
           <a:p>
-            <a:pPr marL="457200" indent="-316440">
+            <a:pPr marL="457200" indent="-316080">
               <a:lnSpc>
                 <a:spcPct val="100000"/>
               </a:lnSpc>
@@ -4194,7 +4055,7 @@
             </a:endParaRPr>
           </a:p>
           <a:p>
-            <a:pPr marL="457200" indent="-316440">
+            <a:pPr marL="457200" indent="-316080">
               <a:lnSpc>
                 <a:spcPct val="100000"/>
               </a:lnSpc>
@@ -4293,7 +4154,7 @@
         <p:spPr>
           <a:xfrm>
             <a:off x="4739760" y="2676600"/>
-            <a:ext cx="4285440" cy="2317320"/>
+            <a:ext cx="4285080" cy="2316960"/>
           </a:xfrm>
           <a:prstGeom prst="rect">
             <a:avLst/>
@@ -4365,7 +4226,7 @@
         <p:spPr>
           <a:xfrm>
             <a:off x="91440" y="274320"/>
-            <a:ext cx="8943480" cy="4556880"/>
+            <a:ext cx="8943120" cy="4556520"/>
           </a:xfrm>
           <a:prstGeom prst="rect">
             <a:avLst/>
@@ -4433,7 +4294,7 @@
         <p:spPr>
           <a:xfrm>
             <a:off x="173160" y="147240"/>
-            <a:ext cx="3575520" cy="4829760"/>
+            <a:ext cx="3575160" cy="4829400"/>
           </a:xfrm>
           <a:prstGeom prst="rect">
             <a:avLst/>
@@ -4483,7 +4344,7 @@
             </a:endParaRPr>
           </a:p>
           <a:p>
-            <a:pPr marL="457200" indent="-316440">
+            <a:pPr marL="457200" indent="-316080">
               <a:lnSpc>
                 <a:spcPct val="100000"/>
               </a:lnSpc>
@@ -4518,7 +4379,7 @@
             </a:endParaRPr>
           </a:p>
           <a:p>
-            <a:pPr lvl="1" marL="914400" indent="-316440">
+            <a:pPr lvl="1" marL="914400" indent="-316080">
               <a:lnSpc>
                 <a:spcPct val="100000"/>
               </a:lnSpc>
@@ -4553,7 +4414,7 @@
             </a:endParaRPr>
           </a:p>
           <a:p>
-            <a:pPr lvl="1" marL="914400" indent="-316440">
+            <a:pPr lvl="1" marL="914400" indent="-316080">
               <a:lnSpc>
                 <a:spcPct val="100000"/>
               </a:lnSpc>
@@ -4588,7 +4449,7 @@
             </a:endParaRPr>
           </a:p>
           <a:p>
-            <a:pPr lvl="1" marL="914400" indent="-316440">
+            <a:pPr lvl="1" marL="914400" indent="-316080">
               <a:lnSpc>
                 <a:spcPct val="100000"/>
               </a:lnSpc>
@@ -4623,7 +4484,7 @@
             </a:endParaRPr>
           </a:p>
           <a:p>
-            <a:pPr lvl="1" marL="914400" indent="-316440">
+            <a:pPr lvl="1" marL="914400" indent="-316080">
               <a:lnSpc>
                 <a:spcPct val="100000"/>
               </a:lnSpc>
@@ -4648,17 +4509,17 @@
             </a:endParaRPr>
           </a:p>
           <a:p>
-            <a:pPr marL="914400" indent="-227520">
-              <a:lnSpc>
-                <a:spcPct val="100000"/>
-              </a:lnSpc>
-            </a:pPr>
-            <a:endParaRPr b="0" lang="en-US" sz="1400" spc="-1" strike="noStrike">
-              <a:latin typeface="Arial"/>
-            </a:endParaRPr>
-          </a:p>
-          <a:p>
-            <a:pPr lvl="1" marL="914400" indent="-316440">
+            <a:pPr marL="914400" indent="-227160">
+              <a:lnSpc>
+                <a:spcPct val="100000"/>
+              </a:lnSpc>
+            </a:pPr>
+            <a:endParaRPr b="0" lang="en-US" sz="1400" spc="-1" strike="noStrike">
+              <a:latin typeface="Arial"/>
+            </a:endParaRPr>
+          </a:p>
+          <a:p>
+            <a:pPr lvl="1" marL="914400" indent="-316080">
               <a:lnSpc>
                 <a:spcPct val="100000"/>
               </a:lnSpc>
@@ -4693,7 +4554,7 @@
             </a:endParaRPr>
           </a:p>
           <a:p>
-            <a:pPr lvl="1" marL="914400" indent="-316440">
+            <a:pPr lvl="1" marL="914400" indent="-316080">
               <a:lnSpc>
                 <a:spcPct val="100000"/>
               </a:lnSpc>
@@ -4728,47 +4589,47 @@
             </a:endParaRPr>
           </a:p>
           <a:p>
-            <a:pPr marL="914400" indent="-227520">
-              <a:lnSpc>
-                <a:spcPct val="100000"/>
-              </a:lnSpc>
-            </a:pPr>
-            <a:endParaRPr b="0" lang="en-US" sz="1400" spc="-1" strike="noStrike">
-              <a:latin typeface="Arial"/>
-            </a:endParaRPr>
-          </a:p>
-          <a:p>
-            <a:pPr marL="914400" indent="-227520">
-              <a:lnSpc>
-                <a:spcPct val="100000"/>
-              </a:lnSpc>
-            </a:pPr>
-            <a:endParaRPr b="0" lang="en-US" sz="1400" spc="-1" strike="noStrike">
-              <a:latin typeface="Arial"/>
-            </a:endParaRPr>
-          </a:p>
-          <a:p>
-            <a:pPr>
-              <a:lnSpc>
-                <a:spcPct val="100000"/>
-              </a:lnSpc>
-            </a:pPr>
-            <a:endParaRPr b="0" lang="en-US" sz="1400" spc="-1" strike="noStrike">
-              <a:latin typeface="Arial"/>
-            </a:endParaRPr>
-          </a:p>
-          <a:p>
-            <a:pPr>
-              <a:lnSpc>
-                <a:spcPct val="100000"/>
-              </a:lnSpc>
-            </a:pPr>
-            <a:endParaRPr b="0" lang="en-US" sz="1400" spc="-1" strike="noStrike">
-              <a:latin typeface="Arial"/>
-            </a:endParaRPr>
-          </a:p>
-          <a:p>
-            <a:pPr marL="914400">
+            <a:pPr marL="914400" indent="-227160">
+              <a:lnSpc>
+                <a:spcPct val="100000"/>
+              </a:lnSpc>
+            </a:pPr>
+            <a:endParaRPr b="0" lang="en-US" sz="1400" spc="-1" strike="noStrike">
+              <a:latin typeface="Arial"/>
+            </a:endParaRPr>
+          </a:p>
+          <a:p>
+            <a:pPr marL="914400" indent="-227160">
+              <a:lnSpc>
+                <a:spcPct val="100000"/>
+              </a:lnSpc>
+            </a:pPr>
+            <a:endParaRPr b="0" lang="en-US" sz="1400" spc="-1" strike="noStrike">
+              <a:latin typeface="Arial"/>
+            </a:endParaRPr>
+          </a:p>
+          <a:p>
+            <a:pPr marL="914400" indent="-227160">
+              <a:lnSpc>
+                <a:spcPct val="100000"/>
+              </a:lnSpc>
+            </a:pPr>
+            <a:endParaRPr b="0" lang="en-US" sz="1400" spc="-1" strike="noStrike">
+              <a:latin typeface="Arial"/>
+            </a:endParaRPr>
+          </a:p>
+          <a:p>
+            <a:pPr marL="914400" indent="-227160">
+              <a:lnSpc>
+                <a:spcPct val="100000"/>
+              </a:lnSpc>
+            </a:pPr>
+            <a:endParaRPr b="0" lang="en-US" sz="1400" spc="-1" strike="noStrike">
+              <a:latin typeface="Arial"/>
+            </a:endParaRPr>
+          </a:p>
+          <a:p>
+            <a:pPr marL="914400" indent="-227160">
               <a:lnSpc>
                 <a:spcPct val="100000"/>
               </a:lnSpc>
@@ -4788,7 +4649,7 @@
         <p:spPr>
           <a:xfrm>
             <a:off x="3931920" y="143640"/>
-            <a:ext cx="3575520" cy="4829760"/>
+            <a:ext cx="3575160" cy="4829400"/>
           </a:xfrm>
           <a:prstGeom prst="rect">
             <a:avLst/>
@@ -4827,7 +4688,7 @@
             </a:endParaRPr>
           </a:p>
           <a:p>
-            <a:pPr marL="457200" indent="-202320">
+            <a:pPr marL="457200" indent="-201960">
               <a:lnSpc>
                 <a:spcPct val="100000"/>
               </a:lnSpc>
@@ -4837,7 +4698,7 @@
             </a:endParaRPr>
           </a:p>
           <a:p>
-            <a:pPr>
+            <a:pPr marL="457200" indent="-201960">
               <a:lnSpc>
                 <a:spcPct val="100000"/>
               </a:lnSpc>
@@ -4847,7 +4708,7 @@
             </a:endParaRPr>
           </a:p>
           <a:p>
-            <a:pPr lvl="1" marL="914400" indent="-316440">
+            <a:pPr lvl="1" marL="914400" indent="-316080">
               <a:lnSpc>
                 <a:spcPct val="100000"/>
               </a:lnSpc>
@@ -4872,17 +4733,17 @@
             </a:endParaRPr>
           </a:p>
           <a:p>
-            <a:pPr marL="914400" indent="-227520">
-              <a:lnSpc>
-                <a:spcPct val="100000"/>
-              </a:lnSpc>
-            </a:pPr>
-            <a:endParaRPr b="0" lang="en-US" sz="1400" spc="-1" strike="noStrike">
-              <a:latin typeface="Arial"/>
-            </a:endParaRPr>
-          </a:p>
-          <a:p>
-            <a:pPr lvl="1" marL="914400" indent="-316440">
+            <a:pPr marL="914400" indent="-227160">
+              <a:lnSpc>
+                <a:spcPct val="100000"/>
+              </a:lnSpc>
+            </a:pPr>
+            <a:endParaRPr b="0" lang="en-US" sz="1400" spc="-1" strike="noStrike">
+              <a:latin typeface="Arial"/>
+            </a:endParaRPr>
+          </a:p>
+          <a:p>
+            <a:pPr lvl="1" marL="914400" indent="-316080">
               <a:lnSpc>
                 <a:spcPct val="100000"/>
               </a:lnSpc>
@@ -4917,7 +4778,7 @@
             </a:endParaRPr>
           </a:p>
           <a:p>
-            <a:pPr lvl="1" marL="914400" indent="-316440">
+            <a:pPr lvl="1" marL="914400" indent="-316080">
               <a:lnSpc>
                 <a:spcPct val="100000"/>
               </a:lnSpc>
@@ -4942,17 +4803,17 @@
             </a:endParaRPr>
           </a:p>
           <a:p>
-            <a:pPr marL="914400" indent="-227520">
-              <a:lnSpc>
-                <a:spcPct val="100000"/>
-              </a:lnSpc>
-            </a:pPr>
-            <a:endParaRPr b="0" lang="en-US" sz="1400" spc="-1" strike="noStrike">
-              <a:latin typeface="Arial"/>
-            </a:endParaRPr>
-          </a:p>
-          <a:p>
-            <a:pPr lvl="1" marL="914400" indent="-316440">
+            <a:pPr marL="914400" indent="-227160">
+              <a:lnSpc>
+                <a:spcPct val="100000"/>
+              </a:lnSpc>
+            </a:pPr>
+            <a:endParaRPr b="0" lang="en-US" sz="1400" spc="-1" strike="noStrike">
+              <a:latin typeface="Arial"/>
+            </a:endParaRPr>
+          </a:p>
+          <a:p>
+            <a:pPr lvl="1" marL="914400" indent="-316080">
               <a:lnSpc>
                 <a:spcPct val="100000"/>
               </a:lnSpc>
@@ -4977,17 +4838,17 @@
             </a:endParaRPr>
           </a:p>
           <a:p>
-            <a:pPr marL="914400" indent="-227520">
-              <a:lnSpc>
-                <a:spcPct val="100000"/>
-              </a:lnSpc>
-            </a:pPr>
-            <a:endParaRPr b="0" lang="en-US" sz="1400" spc="-1" strike="noStrike">
-              <a:latin typeface="Arial"/>
-            </a:endParaRPr>
-          </a:p>
-          <a:p>
-            <a:pPr lvl="1" marL="914400" indent="-316440">
+            <a:pPr marL="914400" indent="-227160">
+              <a:lnSpc>
+                <a:spcPct val="100000"/>
+              </a:lnSpc>
+            </a:pPr>
+            <a:endParaRPr b="0" lang="en-US" sz="1400" spc="-1" strike="noStrike">
+              <a:latin typeface="Arial"/>
+            </a:endParaRPr>
+          </a:p>
+          <a:p>
+            <a:pPr lvl="1" marL="914400" indent="-316080">
               <a:lnSpc>
                 <a:spcPct val="100000"/>
               </a:lnSpc>
@@ -5012,17 +4873,17 @@
             </a:endParaRPr>
           </a:p>
           <a:p>
-            <a:pPr marL="914400" indent="-227520">
-              <a:lnSpc>
-                <a:spcPct val="100000"/>
-              </a:lnSpc>
-            </a:pPr>
-            <a:endParaRPr b="0" lang="en-US" sz="1400" spc="-1" strike="noStrike">
-              <a:latin typeface="Arial"/>
-            </a:endParaRPr>
-          </a:p>
-          <a:p>
-            <a:pPr lvl="1" marL="914400" indent="-316440">
+            <a:pPr marL="914400" indent="-227160">
+              <a:lnSpc>
+                <a:spcPct val="100000"/>
+              </a:lnSpc>
+            </a:pPr>
+            <a:endParaRPr b="0" lang="en-US" sz="1400" spc="-1" strike="noStrike">
+              <a:latin typeface="Arial"/>
+            </a:endParaRPr>
+          </a:p>
+          <a:p>
+            <a:pPr lvl="1" marL="914400" indent="-316080">
               <a:lnSpc>
                 <a:spcPct val="100000"/>
               </a:lnSpc>
@@ -5047,47 +4908,47 @@
             </a:endParaRPr>
           </a:p>
           <a:p>
-            <a:pPr marL="914400" indent="-227520">
-              <a:lnSpc>
-                <a:spcPct val="100000"/>
-              </a:lnSpc>
-            </a:pPr>
-            <a:endParaRPr b="0" lang="en-US" sz="1400" spc="-1" strike="noStrike">
-              <a:latin typeface="Arial"/>
-            </a:endParaRPr>
-          </a:p>
-          <a:p>
-            <a:pPr marL="914400" indent="-227520">
-              <a:lnSpc>
-                <a:spcPct val="100000"/>
-              </a:lnSpc>
-            </a:pPr>
-            <a:endParaRPr b="0" lang="en-US" sz="1400" spc="-1" strike="noStrike">
-              <a:latin typeface="Arial"/>
-            </a:endParaRPr>
-          </a:p>
-          <a:p>
-            <a:pPr>
-              <a:lnSpc>
-                <a:spcPct val="100000"/>
-              </a:lnSpc>
-            </a:pPr>
-            <a:endParaRPr b="0" lang="en-US" sz="1400" spc="-1" strike="noStrike">
-              <a:latin typeface="Arial"/>
-            </a:endParaRPr>
-          </a:p>
-          <a:p>
-            <a:pPr>
-              <a:lnSpc>
-                <a:spcPct val="100000"/>
-              </a:lnSpc>
-            </a:pPr>
-            <a:endParaRPr b="0" lang="en-US" sz="1400" spc="-1" strike="noStrike">
-              <a:latin typeface="Arial"/>
-            </a:endParaRPr>
-          </a:p>
-          <a:p>
-            <a:pPr marL="914400">
+            <a:pPr marL="914400" indent="-227160">
+              <a:lnSpc>
+                <a:spcPct val="100000"/>
+              </a:lnSpc>
+            </a:pPr>
+            <a:endParaRPr b="0" lang="en-US" sz="1400" spc="-1" strike="noStrike">
+              <a:latin typeface="Arial"/>
+            </a:endParaRPr>
+          </a:p>
+          <a:p>
+            <a:pPr marL="914400" indent="-227160">
+              <a:lnSpc>
+                <a:spcPct val="100000"/>
+              </a:lnSpc>
+            </a:pPr>
+            <a:endParaRPr b="0" lang="en-US" sz="1400" spc="-1" strike="noStrike">
+              <a:latin typeface="Arial"/>
+            </a:endParaRPr>
+          </a:p>
+          <a:p>
+            <a:pPr marL="914400" indent="-227160">
+              <a:lnSpc>
+                <a:spcPct val="100000"/>
+              </a:lnSpc>
+            </a:pPr>
+            <a:endParaRPr b="0" lang="en-US" sz="1400" spc="-1" strike="noStrike">
+              <a:latin typeface="Arial"/>
+            </a:endParaRPr>
+          </a:p>
+          <a:p>
+            <a:pPr marL="914400" indent="-227160">
+              <a:lnSpc>
+                <a:spcPct val="100000"/>
+              </a:lnSpc>
+            </a:pPr>
+            <a:endParaRPr b="0" lang="en-US" sz="1400" spc="-1" strike="noStrike">
+              <a:latin typeface="Arial"/>
+            </a:endParaRPr>
+          </a:p>
+          <a:p>
+            <a:pPr marL="914400" indent="-227160">
               <a:lnSpc>
                 <a:spcPct val="100000"/>
               </a:lnSpc>
@@ -5111,7 +4972,7 @@
         <p:spPr>
           <a:xfrm>
             <a:off x="2834640" y="4259520"/>
-            <a:ext cx="2837880" cy="677880"/>
+            <a:ext cx="2837520" cy="677520"/>
           </a:xfrm>
           <a:prstGeom prst="rect">
             <a:avLst/>
@@ -5134,7 +4995,7 @@
         <p:spPr>
           <a:xfrm>
             <a:off x="6126480" y="3931920"/>
-            <a:ext cx="1096920" cy="1096920"/>
+            <a:ext cx="1096560" cy="1096560"/>
           </a:xfrm>
           <a:prstGeom prst="rect">
             <a:avLst/>
@@ -5157,7 +5018,7 @@
         <p:spPr>
           <a:xfrm>
             <a:off x="7507800" y="4297680"/>
-            <a:ext cx="1371240" cy="572040"/>
+            <a:ext cx="1370880" cy="571680"/>
           </a:xfrm>
           <a:prstGeom prst="rect">
             <a:avLst/>
@@ -5229,7 +5090,7 @@
         <p:spPr>
           <a:xfrm>
             <a:off x="411840" y="407160"/>
-            <a:ext cx="8441640" cy="4317480"/>
+            <a:ext cx="8441280" cy="4317120"/>
           </a:xfrm>
           <a:prstGeom prst="rect">
             <a:avLst/>
@@ -5301,7 +5162,7 @@
         <p:spPr>
           <a:xfrm>
             <a:off x="1194120" y="800280"/>
-            <a:ext cx="7180920" cy="3542400"/>
+            <a:ext cx="7180560" cy="3542040"/>
           </a:xfrm>
           <a:prstGeom prst="rect">
             <a:avLst/>
@@ -5373,7 +5234,7 @@
         <p:spPr>
           <a:xfrm>
             <a:off x="341280" y="401040"/>
-            <a:ext cx="8460000" cy="4307040"/>
+            <a:ext cx="8459640" cy="4306680"/>
           </a:xfrm>
           <a:prstGeom prst="rect">
             <a:avLst/>
@@ -5445,7 +5306,7 @@
         <p:spPr>
           <a:xfrm>
             <a:off x="152280" y="609480"/>
-            <a:ext cx="8838000" cy="4055760"/>
+            <a:ext cx="8837640" cy="4055400"/>
           </a:xfrm>
           <a:prstGeom prst="rect">
             <a:avLst/>
@@ -5517,7 +5378,7 @@
         <p:spPr>
           <a:xfrm>
             <a:off x="252720" y="600120"/>
-            <a:ext cx="8838000" cy="4093920"/>
+            <a:ext cx="8837640" cy="4093560"/>
           </a:xfrm>
           <a:prstGeom prst="rect">
             <a:avLst/>
@@ -5589,7 +5450,7 @@
         <p:spPr>
           <a:xfrm>
             <a:off x="155880" y="91440"/>
-            <a:ext cx="5688000" cy="3170160"/>
+            <a:ext cx="5687640" cy="3169800"/>
           </a:xfrm>
           <a:prstGeom prst="rect">
             <a:avLst/>
@@ -5612,7 +5473,7 @@
         <p:spPr>
           <a:xfrm>
             <a:off x="155880" y="2070000"/>
-            <a:ext cx="6336000" cy="2742840"/>
+            <a:ext cx="6335640" cy="2742480"/>
           </a:xfrm>
           <a:prstGeom prst="rect">
             <a:avLst/>
@@ -5635,7 +5496,7 @@
         <p:spPr>
           <a:xfrm>
             <a:off x="5486400" y="3723480"/>
-            <a:ext cx="3382920" cy="1213920"/>
+            <a:ext cx="3382560" cy="1213560"/>
           </a:xfrm>
           <a:prstGeom prst="rect">
             <a:avLst/>
@@ -5707,7 +5568,7 @@
         <p:spPr>
           <a:xfrm>
             <a:off x="680040" y="378000"/>
-            <a:ext cx="7782840" cy="4386240"/>
+            <a:ext cx="7782480" cy="4385880"/>
           </a:xfrm>
           <a:prstGeom prst="rect">
             <a:avLst/>
@@ -5779,7 +5640,7 @@
         <p:spPr>
           <a:xfrm>
             <a:off x="152280" y="358920"/>
-            <a:ext cx="8838000" cy="4399200"/>
+            <a:ext cx="8837640" cy="4398840"/>
           </a:xfrm>
           <a:prstGeom prst="rect">
             <a:avLst/>
@@ -5851,7 +5712,7 @@
         <p:spPr>
           <a:xfrm>
             <a:off x="152280" y="307800"/>
-            <a:ext cx="8838000" cy="4526640"/>
+            <a:ext cx="8837640" cy="4526280"/>
           </a:xfrm>
           <a:prstGeom prst="rect">
             <a:avLst/>
@@ -5923,7 +5784,7 @@
         <p:spPr>
           <a:xfrm>
             <a:off x="152280" y="478080"/>
-            <a:ext cx="8838000" cy="4389120"/>
+            <a:ext cx="8837640" cy="4388760"/>
           </a:xfrm>
           <a:prstGeom prst="rect">
             <a:avLst/>
@@ -5991,7 +5852,7 @@
         <p:spPr>
           <a:xfrm>
             <a:off x="173160" y="147240"/>
-            <a:ext cx="8632440" cy="4361400"/>
+            <a:ext cx="8632080" cy="4361040"/>
           </a:xfrm>
           <a:prstGeom prst="rect">
             <a:avLst/>
@@ -6041,7 +5902,7 @@
             </a:endParaRPr>
           </a:p>
           <a:p>
-            <a:pPr marL="457200" indent="-316440">
+            <a:pPr marL="457200" indent="-316080">
               <a:lnSpc>
                 <a:spcPct val="100000"/>
               </a:lnSpc>
@@ -6096,7 +5957,7 @@
             </a:endParaRPr>
           </a:p>
           <a:p>
-            <a:pPr marL="457200" indent="-316440">
+            <a:pPr marL="457200" indent="-316080">
               <a:lnSpc>
                 <a:spcPct val="100000"/>
               </a:lnSpc>
@@ -6141,7 +6002,7 @@
             </a:endParaRPr>
           </a:p>
           <a:p>
-            <a:pPr lvl="1" marL="914400" indent="-316440">
+            <a:pPr lvl="1" marL="914400" indent="-316080">
               <a:lnSpc>
                 <a:spcPct val="100000"/>
               </a:lnSpc>
@@ -6246,7 +6107,7 @@
             </a:endParaRPr>
           </a:p>
           <a:p>
-            <a:pPr marL="457200" indent="-316440">
+            <a:pPr marL="457200" indent="-316080">
               <a:lnSpc>
                 <a:spcPct val="100000"/>
               </a:lnSpc>
@@ -6361,7 +6222,7 @@
             </a:endParaRPr>
           </a:p>
           <a:p>
-            <a:pPr marL="457200" indent="-316440">
+            <a:pPr marL="457200" indent="-316080">
               <a:lnSpc>
                 <a:spcPct val="100000"/>
               </a:lnSpc>
@@ -6416,7 +6277,7 @@
             </a:endParaRPr>
           </a:p>
           <a:p>
-            <a:pPr marL="457200" indent="-316440">
+            <a:pPr marL="457200" indent="-316080">
               <a:lnSpc>
                 <a:spcPct val="100000"/>
               </a:lnSpc>
@@ -6534,7 +6395,7 @@
         <p:spPr>
           <a:xfrm>
             <a:off x="445680" y="260280"/>
-            <a:ext cx="8097120" cy="4621680"/>
+            <a:ext cx="8096760" cy="4621320"/>
           </a:xfrm>
           <a:prstGeom prst="rect">
             <a:avLst/>
@@ -6606,7 +6467,7 @@
         <p:spPr>
           <a:xfrm>
             <a:off x="76320" y="380880"/>
-            <a:ext cx="8838000" cy="1771200"/>
+            <a:ext cx="8837640" cy="1770840"/>
           </a:xfrm>
           <a:prstGeom prst="rect">
             <a:avLst/>
@@ -6629,7 +6490,7 @@
         <p:spPr>
           <a:xfrm>
             <a:off x="76320" y="2381760"/>
-            <a:ext cx="8838000" cy="2161080"/>
+            <a:ext cx="8837640" cy="2160720"/>
           </a:xfrm>
           <a:prstGeom prst="rect">
             <a:avLst/>
@@ -6701,7 +6562,7 @@
         <p:spPr>
           <a:xfrm>
             <a:off x="1601640" y="260280"/>
-            <a:ext cx="5940000" cy="4621680"/>
+            <a:ext cx="5939640" cy="4621320"/>
           </a:xfrm>
           <a:prstGeom prst="rect">
             <a:avLst/>
@@ -6773,7 +6634,7 @@
         <p:spPr>
           <a:xfrm>
             <a:off x="216000" y="84960"/>
-            <a:ext cx="8710920" cy="2991600"/>
+            <a:ext cx="8710560" cy="2991240"/>
           </a:xfrm>
           <a:prstGeom prst="rect">
             <a:avLst/>
@@ -6796,7 +6657,7 @@
         <p:spPr>
           <a:xfrm>
             <a:off x="46080" y="3307320"/>
-            <a:ext cx="4330800" cy="1657080"/>
+            <a:ext cx="4330440" cy="1656720"/>
           </a:xfrm>
           <a:prstGeom prst="rect">
             <a:avLst/>
@@ -6819,7 +6680,7 @@
         <p:spPr>
           <a:xfrm>
             <a:off x="4551480" y="3370680"/>
-            <a:ext cx="4600440" cy="1530360"/>
+            <a:ext cx="4600080" cy="1530000"/>
           </a:xfrm>
           <a:prstGeom prst="rect">
             <a:avLst/>
@@ -6891,7 +6752,7 @@
         <p:spPr>
           <a:xfrm>
             <a:off x="152280" y="155520"/>
-            <a:ext cx="8685720" cy="2558160"/>
+            <a:ext cx="8685360" cy="2557800"/>
           </a:xfrm>
           <a:prstGeom prst="rect">
             <a:avLst/>
@@ -6914,7 +6775,7 @@
         <p:spPr>
           <a:xfrm>
             <a:off x="152280" y="2132280"/>
-            <a:ext cx="8685720" cy="2606400"/>
+            <a:ext cx="8685360" cy="2606040"/>
           </a:xfrm>
           <a:prstGeom prst="rect">
             <a:avLst/>
@@ -6986,7 +6847,7 @@
         <p:spPr>
           <a:xfrm>
             <a:off x="360" y="0"/>
-            <a:ext cx="8868960" cy="2597760"/>
+            <a:ext cx="8868600" cy="2597400"/>
           </a:xfrm>
           <a:prstGeom prst="rect">
             <a:avLst/>
@@ -7009,7 +6870,7 @@
         <p:spPr>
           <a:xfrm>
             <a:off x="91440" y="2651760"/>
-            <a:ext cx="8686080" cy="2373840"/>
+            <a:ext cx="8685720" cy="2373480"/>
           </a:xfrm>
           <a:prstGeom prst="rect">
             <a:avLst/>
@@ -7077,7 +6938,7 @@
         <p:spPr>
           <a:xfrm>
             <a:off x="117360" y="91440"/>
-            <a:ext cx="8889120" cy="4986000"/>
+            <a:ext cx="8888760" cy="4985640"/>
           </a:xfrm>
           <a:prstGeom prst="rect">
             <a:avLst/>
@@ -7103,7 +6964,7 @@
         <p:spPr>
           <a:xfrm>
             <a:off x="210960" y="69480"/>
-            <a:ext cx="8733600" cy="4838400"/>
+            <a:ext cx="8733240" cy="4838040"/>
           </a:xfrm>
           <a:prstGeom prst="rect">
             <a:avLst/>
@@ -7153,7 +7014,7 @@
             </a:endParaRPr>
           </a:p>
           <a:p>
-            <a:pPr marL="457200" indent="-316440">
+            <a:pPr marL="457200" indent="-316080">
               <a:lnSpc>
                 <a:spcPct val="100000"/>
               </a:lnSpc>
@@ -7202,7 +7063,7 @@
         <p:spPr>
           <a:xfrm>
             <a:off x="6492240" y="1463040"/>
-            <a:ext cx="2285640" cy="1377360"/>
+            <a:ext cx="2285280" cy="1377000"/>
           </a:xfrm>
           <a:prstGeom prst="rect">
             <a:avLst/>
@@ -7270,7 +7131,7 @@
         <p:spPr>
           <a:xfrm>
             <a:off x="117360" y="91440"/>
-            <a:ext cx="8889120" cy="4986000"/>
+            <a:ext cx="8888760" cy="4985640"/>
           </a:xfrm>
           <a:prstGeom prst="rect">
             <a:avLst/>
@@ -7296,7 +7157,7 @@
         <p:spPr>
           <a:xfrm>
             <a:off x="210960" y="69480"/>
-            <a:ext cx="8733600" cy="4838400"/>
+            <a:ext cx="8733240" cy="4838040"/>
           </a:xfrm>
           <a:prstGeom prst="rect">
             <a:avLst/>
@@ -7346,7 +7207,7 @@
             </a:endParaRPr>
           </a:p>
           <a:p>
-            <a:pPr marL="457200" indent="-195840">
+            <a:pPr marL="457200" indent="-195480">
               <a:lnSpc>
                 <a:spcPct val="100000"/>
               </a:lnSpc>
@@ -7356,7 +7217,7 @@
             </a:endParaRPr>
           </a:p>
           <a:p>
-            <a:pPr>
+            <a:pPr marL="457200" indent="-195480">
               <a:lnSpc>
                 <a:spcPct val="100000"/>
               </a:lnSpc>
@@ -7376,7 +7237,7 @@
         <p:spPr>
           <a:xfrm>
             <a:off x="221760" y="640080"/>
-            <a:ext cx="8412120" cy="345960"/>
+            <a:ext cx="8411760" cy="345600"/>
           </a:xfrm>
           <a:prstGeom prst="rect">
             <a:avLst/>
@@ -7471,7 +7332,7 @@
         <p:spPr>
           <a:xfrm>
             <a:off x="666000" y="3184560"/>
-            <a:ext cx="2390040" cy="1723320"/>
+            <a:ext cx="2389680" cy="1722960"/>
           </a:xfrm>
           <a:prstGeom prst="rect">
             <a:avLst/>
@@ -7494,7 +7355,7 @@
         <p:spPr>
           <a:xfrm>
             <a:off x="3180960" y="1371600"/>
-            <a:ext cx="5780880" cy="3523680"/>
+            <a:ext cx="5780520" cy="3523320"/>
           </a:xfrm>
           <a:prstGeom prst="rect">
             <a:avLst/>
@@ -7562,7 +7423,7 @@
         <p:spPr>
           <a:xfrm>
             <a:off x="117360" y="91440"/>
-            <a:ext cx="8889120" cy="4986000"/>
+            <a:ext cx="8888760" cy="4985640"/>
           </a:xfrm>
           <a:prstGeom prst="rect">
             <a:avLst/>
@@ -7588,7 +7449,7 @@
         <p:spPr>
           <a:xfrm>
             <a:off x="210960" y="69480"/>
-            <a:ext cx="8733600" cy="4838400"/>
+            <a:ext cx="8733240" cy="4838040"/>
           </a:xfrm>
           <a:prstGeom prst="rect">
             <a:avLst/>
@@ -7658,7 +7519,7 @@
         <p:spPr>
           <a:xfrm>
             <a:off x="221760" y="640080"/>
-            <a:ext cx="8412120" cy="345960"/>
+            <a:ext cx="8411760" cy="345600"/>
           </a:xfrm>
           <a:prstGeom prst="rect">
             <a:avLst/>
@@ -7753,7 +7614,7 @@
         <p:spPr>
           <a:xfrm>
             <a:off x="809640" y="3291840"/>
-            <a:ext cx="2223000" cy="1590120"/>
+            <a:ext cx="2222640" cy="1589760"/>
           </a:xfrm>
           <a:prstGeom prst="rect">
             <a:avLst/>
@@ -7776,7 +7637,7 @@
         <p:spPr>
           <a:xfrm>
             <a:off x="3200400" y="1371600"/>
-            <a:ext cx="5761800" cy="3523680"/>
+            <a:ext cx="5761440" cy="3523320"/>
           </a:xfrm>
           <a:prstGeom prst="rect">
             <a:avLst/>
@@ -7844,7 +7705,7 @@
         <p:spPr>
           <a:xfrm>
             <a:off x="117360" y="91440"/>
-            <a:ext cx="8889120" cy="4986000"/>
+            <a:ext cx="8888760" cy="4985640"/>
           </a:xfrm>
           <a:prstGeom prst="rect">
             <a:avLst/>
@@ -7870,7 +7731,7 @@
         <p:spPr>
           <a:xfrm>
             <a:off x="210960" y="69480"/>
-            <a:ext cx="8733600" cy="4838400"/>
+            <a:ext cx="8733240" cy="4838040"/>
           </a:xfrm>
           <a:prstGeom prst="rect">
             <a:avLst/>
@@ -7940,7 +7801,7 @@
         <p:spPr>
           <a:xfrm>
             <a:off x="221760" y="487800"/>
-            <a:ext cx="8412120" cy="601920"/>
+            <a:ext cx="8411760" cy="601560"/>
           </a:xfrm>
           <a:prstGeom prst="rect">
             <a:avLst/>
@@ -8025,7 +7886,7 @@
         <p:spPr>
           <a:xfrm>
             <a:off x="839520" y="3377520"/>
-            <a:ext cx="2390400" cy="1733040"/>
+            <a:ext cx="2390040" cy="1732680"/>
           </a:xfrm>
           <a:prstGeom prst="rect">
             <a:avLst/>
@@ -8048,7 +7909,7 @@
         <p:spPr>
           <a:xfrm>
             <a:off x="3362760" y="1605600"/>
-            <a:ext cx="5762160" cy="3504960"/>
+            <a:ext cx="5761800" cy="3504600"/>
           </a:xfrm>
           <a:prstGeom prst="rect">
             <a:avLst/>
@@ -8066,8 +7927,8 @@
         </p:nvSpPr>
         <p:spPr>
           <a:xfrm>
-            <a:off x="134640" y="1166400"/>
-            <a:ext cx="3018960" cy="2126160"/>
+            <a:off x="134640" y="1089360"/>
+            <a:ext cx="3157200" cy="2202840"/>
           </a:xfrm>
           <a:prstGeom prst="rect">
             <a:avLst/>
@@ -8087,7 +7948,7 @@
           <a:fontRef idx="minor"/>
         </p:style>
         <p:txBody>
-          <a:bodyPr tIns="91440" bIns="91440"/>
+          <a:bodyPr lIns="90000" rIns="90000" tIns="91440" bIns="91440"/>
           <a:p>
             <a:pPr>
               <a:lnSpc>
@@ -8095,7 +7956,7 @@
               </a:lnSpc>
             </a:pPr>
             <a:r>
-              <a:rPr b="1" lang="en-US" sz="1300" spc="-1" strike="noStrike" u="sng">
+              <a:rPr b="1" lang="en-US" sz="1200" spc="-1" strike="noStrike" u="sng">
                 <a:solidFill>
                   <a:srgbClr val="ffffff"/>
                 </a:solidFill>
@@ -8106,16 +7967,66 @@
               <a:t>Important:</a:t>
             </a:r>
             <a:r>
-              <a:rPr b="0" lang="en-US" sz="1300" spc="-1" strike="noStrike">
-                <a:solidFill>
-                  <a:srgbClr val="ffffff"/>
-                </a:solidFill>
-                <a:latin typeface="Arial"/>
-                <a:ea typeface="Arial"/>
-              </a:rPr>
-              <a:t> For concurrency equal to 1 (c=1), the response time is very high but it decreases to the desired levels for greater concurrency (50, 100, etc.). We came to the conclusion that this happens due to the network latency and the fact that we have a lot of database disconnections and new connections when c = 1 (that does not happen in the concurrent requests).   </a:t>
-            </a:r>
-            <a:endParaRPr b="0" lang="en-US" sz="1300" spc="-1" strike="noStrike">
+              <a:rPr b="0" lang="en-US" sz="1200" spc="-1" strike="noStrike">
+                <a:solidFill>
+                  <a:srgbClr val="ffffff"/>
+                </a:solidFill>
+                <a:latin typeface="Arial"/>
+                <a:ea typeface="Arial"/>
+              </a:rPr>
+              <a:t> For concurrency equal to 1 (c=1), the response time is very high but it decreases to the desired levels for greater concurrency (50, 100, etc.). We came to the conclusion that this happens due to the network latency and the fact that </a:t>
+            </a:r>
+            <a:r>
+              <a:rPr b="1" lang="en-US" sz="1200" spc="-1" strike="noStrike">
+                <a:solidFill>
+                  <a:srgbClr val="ffffff"/>
+                </a:solidFill>
+                <a:latin typeface="Arial"/>
+                <a:ea typeface="Arial"/>
+              </a:rPr>
+              <a:t>we have a lot of database connections</a:t>
+            </a:r>
+            <a:r>
+              <a:rPr b="0" lang="en-US" sz="1200" spc="-1" strike="noStrike">
+                <a:solidFill>
+                  <a:srgbClr val="ffffff"/>
+                </a:solidFill>
+                <a:latin typeface="Arial"/>
+                <a:ea typeface="Arial"/>
+              </a:rPr>
+              <a:t> </a:t>
+            </a:r>
+            <a:r>
+              <a:rPr b="0" lang="en-US" sz="1200" spc="-1" strike="noStrike">
+                <a:solidFill>
+                  <a:srgbClr val="ffffff"/>
+                </a:solidFill>
+                <a:latin typeface="Arial"/>
+                <a:ea typeface="Arial"/>
+              </a:rPr>
+              <a:t>(i.e for every request we have a new connection and disconnection with the database) when </a:t>
+            </a:r>
+            <a:endParaRPr b="0" lang="en-US" sz="1200" spc="-1" strike="noStrike">
+              <a:latin typeface="Arial"/>
+            </a:endParaRPr>
+          </a:p>
+          <a:p>
+            <a:pPr>
+              <a:lnSpc>
+                <a:spcPct val="100000"/>
+              </a:lnSpc>
+            </a:pPr>
+            <a:r>
+              <a:rPr b="0" lang="en-US" sz="1200" spc="-1" strike="noStrike">
+                <a:solidFill>
+                  <a:srgbClr val="ffffff"/>
+                </a:solidFill>
+                <a:latin typeface="Arial"/>
+                <a:ea typeface="Arial"/>
+              </a:rPr>
+              <a:t>c = 1 - that does not happen in concurrent requests.   </a:t>
+            </a:r>
+            <a:endParaRPr b="0" lang="en-US" sz="1200" spc="-1" strike="noStrike">
               <a:latin typeface="Arial"/>
             </a:endParaRPr>
           </a:p>
@@ -8179,7 +8090,7 @@
         <p:spPr>
           <a:xfrm>
             <a:off x="-519120" y="180000"/>
-            <a:ext cx="2998800" cy="2998800"/>
+            <a:ext cx="2998440" cy="2998440"/>
           </a:xfrm>
           <a:prstGeom prst="rect">
             <a:avLst/>
@@ -8283,7 +8194,7 @@
         <p:spPr>
           <a:xfrm>
             <a:off x="2068920" y="41760"/>
-            <a:ext cx="5983200" cy="5065560"/>
+            <a:ext cx="5982840" cy="5065200"/>
           </a:xfrm>
           <a:prstGeom prst="rect">
             <a:avLst/>
@@ -8351,7 +8262,7 @@
         <p:spPr>
           <a:xfrm>
             <a:off x="117360" y="91440"/>
-            <a:ext cx="8889120" cy="4986000"/>
+            <a:ext cx="8888760" cy="4985640"/>
           </a:xfrm>
           <a:prstGeom prst="rect">
             <a:avLst/>
@@ -8377,7 +8288,7 @@
         <p:spPr>
           <a:xfrm>
             <a:off x="210960" y="69480"/>
-            <a:ext cx="8733600" cy="4838400"/>
+            <a:ext cx="8733240" cy="4838040"/>
           </a:xfrm>
           <a:prstGeom prst="rect">
             <a:avLst/>
@@ -8447,7 +8358,7 @@
         <p:spPr>
           <a:xfrm>
             <a:off x="221760" y="640080"/>
-            <a:ext cx="8412120" cy="345960"/>
+            <a:ext cx="8411760" cy="345600"/>
           </a:xfrm>
           <a:prstGeom prst="rect">
             <a:avLst/>
@@ -8500,7 +8411,7 @@
         <p:spPr>
           <a:xfrm>
             <a:off x="174960" y="1677240"/>
-            <a:ext cx="4360680" cy="3021840"/>
+            <a:ext cx="4360320" cy="3021480"/>
           </a:xfrm>
           <a:prstGeom prst="rect">
             <a:avLst/>
@@ -8523,7 +8434,7 @@
         <p:spPr>
           <a:xfrm>
             <a:off x="4681080" y="1645920"/>
-            <a:ext cx="4325400" cy="3072600"/>
+            <a:ext cx="4325040" cy="3072240"/>
           </a:xfrm>
           <a:prstGeom prst="rect">
             <a:avLst/>
@@ -8546,7 +8457,7 @@
         <p:spPr>
           <a:xfrm>
             <a:off x="7680960" y="182880"/>
-            <a:ext cx="1188360" cy="1188360"/>
+            <a:ext cx="1188000" cy="1188000"/>
           </a:xfrm>
           <a:prstGeom prst="rect">
             <a:avLst/>
@@ -8614,7 +8525,7 @@
         <p:spPr>
           <a:xfrm>
             <a:off x="117360" y="91440"/>
-            <a:ext cx="8889120" cy="4986000"/>
+            <a:ext cx="8888760" cy="4985640"/>
           </a:xfrm>
           <a:prstGeom prst="rect">
             <a:avLst/>
@@ -8640,7 +8551,7 @@
         <p:spPr>
           <a:xfrm>
             <a:off x="210960" y="69480"/>
-            <a:ext cx="8733600" cy="4838400"/>
+            <a:ext cx="8733240" cy="4838040"/>
           </a:xfrm>
           <a:prstGeom prst="rect">
             <a:avLst/>
@@ -8690,7 +8601,7 @@
             </a:endParaRPr>
           </a:p>
           <a:p>
-            <a:pPr marL="457200" indent="-316440">
+            <a:pPr marL="457200" indent="-316080">
               <a:lnSpc>
                 <a:spcPct val="100000"/>
               </a:lnSpc>
@@ -8725,7 +8636,7 @@
             </a:endParaRPr>
           </a:p>
           <a:p>
-            <a:pPr marL="457200" indent="-316440">
+            <a:pPr marL="457200" indent="-316080">
               <a:lnSpc>
                 <a:spcPct val="100000"/>
               </a:lnSpc>
@@ -8760,7 +8671,7 @@
             </a:endParaRPr>
           </a:p>
           <a:p>
-            <a:pPr marL="457200" indent="-316440">
+            <a:pPr marL="457200" indent="-316080">
               <a:lnSpc>
                 <a:spcPct val="100000"/>
               </a:lnSpc>
@@ -8864,7 +8775,7 @@
         <p:spPr>
           <a:xfrm>
             <a:off x="117360" y="91440"/>
-            <a:ext cx="8889120" cy="4986000"/>
+            <a:ext cx="8888760" cy="4985640"/>
           </a:xfrm>
           <a:prstGeom prst="rect">
             <a:avLst/>
@@ -8890,7 +8801,7 @@
         <p:spPr>
           <a:xfrm>
             <a:off x="210960" y="69480"/>
-            <a:ext cx="8733600" cy="4838400"/>
+            <a:ext cx="8733240" cy="4838040"/>
           </a:xfrm>
           <a:prstGeom prst="rect">
             <a:avLst/>
@@ -8940,7 +8851,7 @@
             </a:endParaRPr>
           </a:p>
           <a:p>
-            <a:pPr marL="457200" indent="-316440">
+            <a:pPr marL="457200" indent="-316080">
               <a:lnSpc>
                 <a:spcPct val="100000"/>
               </a:lnSpc>
@@ -8975,7 +8886,7 @@
             </a:endParaRPr>
           </a:p>
           <a:p>
-            <a:pPr marL="457200" indent="-316440">
+            <a:pPr marL="457200" indent="-316080">
               <a:lnSpc>
                 <a:spcPct val="100000"/>
               </a:lnSpc>
@@ -9000,17 +8911,17 @@
             </a:endParaRPr>
           </a:p>
           <a:p>
-            <a:pPr marL="457200" indent="-227520">
-              <a:lnSpc>
-                <a:spcPct val="100000"/>
-              </a:lnSpc>
-            </a:pPr>
-            <a:endParaRPr b="0" lang="en-US" sz="1400" spc="-1" strike="noStrike">
-              <a:latin typeface="Arial"/>
-            </a:endParaRPr>
-          </a:p>
-          <a:p>
-            <a:pPr marL="457200" indent="-316440">
+            <a:pPr marL="457200" indent="-227160">
+              <a:lnSpc>
+                <a:spcPct val="100000"/>
+              </a:lnSpc>
+            </a:pPr>
+            <a:endParaRPr b="0" lang="en-US" sz="1400" spc="-1" strike="noStrike">
+              <a:latin typeface="Arial"/>
+            </a:endParaRPr>
+          </a:p>
+          <a:p>
+            <a:pPr marL="457200" indent="-316080">
               <a:lnSpc>
                 <a:spcPct val="100000"/>
               </a:lnSpc>
@@ -9124,7 +9035,7 @@
         <p:spPr>
           <a:xfrm>
             <a:off x="117360" y="91440"/>
-            <a:ext cx="8889120" cy="4986000"/>
+            <a:ext cx="8888760" cy="4985640"/>
           </a:xfrm>
           <a:prstGeom prst="rect">
             <a:avLst/>
@@ -9150,7 +9061,7 @@
         <p:spPr>
           <a:xfrm>
             <a:off x="205200" y="1386720"/>
-            <a:ext cx="8733600" cy="4838400"/>
+            <a:ext cx="8733240" cy="4838040"/>
           </a:xfrm>
           <a:prstGeom prst="rect">
             <a:avLst/>
@@ -9343,7 +9254,7 @@
         <p:spPr>
           <a:xfrm>
             <a:off x="2066760" y="396360"/>
-            <a:ext cx="5188680" cy="2921760"/>
+            <a:ext cx="5188320" cy="2921400"/>
           </a:xfrm>
           <a:prstGeom prst="rect">
             <a:avLst/>
@@ -9411,7 +9322,7 @@
         <p:spPr>
           <a:xfrm>
             <a:off x="117360" y="91440"/>
-            <a:ext cx="8889120" cy="4986000"/>
+            <a:ext cx="8888760" cy="4985640"/>
           </a:xfrm>
           <a:prstGeom prst="rect">
             <a:avLst/>
@@ -9437,7 +9348,7 @@
         <p:spPr>
           <a:xfrm>
             <a:off x="210960" y="69480"/>
-            <a:ext cx="2792520" cy="573480"/>
+            <a:ext cx="2792160" cy="573120"/>
           </a:xfrm>
           <a:prstGeom prst="rect">
             <a:avLst/>
@@ -9491,7 +9402,7 @@
         <p:spPr>
           <a:xfrm>
             <a:off x="1061640" y="548640"/>
-            <a:ext cx="7020360" cy="4594680"/>
+            <a:ext cx="7020000" cy="4594320"/>
           </a:xfrm>
           <a:prstGeom prst="rect">
             <a:avLst/>
@@ -9559,7 +9470,7 @@
         <p:spPr>
           <a:xfrm>
             <a:off x="117360" y="91440"/>
-            <a:ext cx="8889120" cy="4986000"/>
+            <a:ext cx="8888760" cy="4985640"/>
           </a:xfrm>
           <a:prstGeom prst="rect">
             <a:avLst/>
@@ -9585,7 +9496,7 @@
         <p:spPr>
           <a:xfrm>
             <a:off x="210960" y="69480"/>
-            <a:ext cx="2792520" cy="573480"/>
+            <a:ext cx="2792160" cy="573120"/>
           </a:xfrm>
           <a:prstGeom prst="rect">
             <a:avLst/>
@@ -9639,7 +9550,7 @@
         <p:spPr>
           <a:xfrm>
             <a:off x="2377440" y="527400"/>
-            <a:ext cx="6703200" cy="4587480"/>
+            <a:ext cx="6702840" cy="4587120"/>
           </a:xfrm>
           <a:prstGeom prst="rect">
             <a:avLst/>
@@ -9707,7 +9618,7 @@
         <p:spPr>
           <a:xfrm>
             <a:off x="117360" y="91440"/>
-            <a:ext cx="8889120" cy="4986000"/>
+            <a:ext cx="8888760" cy="4985640"/>
           </a:xfrm>
           <a:prstGeom prst="rect">
             <a:avLst/>
@@ -9733,7 +9644,7 @@
         <p:spPr>
           <a:xfrm>
             <a:off x="210960" y="69480"/>
-            <a:ext cx="2792520" cy="573480"/>
+            <a:ext cx="2792160" cy="573120"/>
           </a:xfrm>
           <a:prstGeom prst="rect">
             <a:avLst/>
@@ -9787,7 +9698,7 @@
         <p:spPr>
           <a:xfrm>
             <a:off x="263880" y="743040"/>
-            <a:ext cx="8615880" cy="3657240"/>
+            <a:ext cx="8615520" cy="3656880"/>
           </a:xfrm>
           <a:prstGeom prst="rect">
             <a:avLst/>
@@ -9855,7 +9766,7 @@
         <p:spPr>
           <a:xfrm>
             <a:off x="117360" y="167400"/>
-            <a:ext cx="8889120" cy="4986000"/>
+            <a:ext cx="8888760" cy="4985640"/>
           </a:xfrm>
           <a:prstGeom prst="rect">
             <a:avLst/>
@@ -9943,7 +9854,7 @@
             </a:endParaRPr>
           </a:p>
           <a:p>
-            <a:pPr marL="457200" indent="-316440">
+            <a:pPr marL="457200" indent="-316080">
               <a:lnSpc>
                 <a:spcPct val="115000"/>
               </a:lnSpc>
@@ -9971,7 +9882,7 @@
             </a:endParaRPr>
           </a:p>
           <a:p>
-            <a:pPr marL="457200" indent="-316440">
+            <a:pPr marL="457200" indent="-316080">
               <a:lnSpc>
                 <a:spcPct val="115000"/>
               </a:lnSpc>
@@ -9996,7 +9907,7 @@
             </a:endParaRPr>
           </a:p>
           <a:p>
-            <a:pPr marL="457200" indent="-316440">
+            <a:pPr marL="457200" indent="-316080">
               <a:lnSpc>
                 <a:spcPct val="115000"/>
               </a:lnSpc>
@@ -10021,7 +9932,7 @@
             </a:endParaRPr>
           </a:p>
           <a:p>
-            <a:pPr marL="457200" indent="-316440">
+            <a:pPr marL="457200" indent="-316080">
               <a:lnSpc>
                 <a:spcPct val="115000"/>
               </a:lnSpc>
@@ -10046,7 +9957,7 @@
             </a:endParaRPr>
           </a:p>
           <a:p>
-            <a:pPr marL="457200" indent="-316440">
+            <a:pPr marL="457200" indent="-316080">
               <a:lnSpc>
                 <a:spcPct val="115000"/>
               </a:lnSpc>
@@ -10094,7 +10005,7 @@
         <p:spPr>
           <a:xfrm>
             <a:off x="210960" y="-9720"/>
-            <a:ext cx="2792520" cy="573480"/>
+            <a:ext cx="2792160" cy="573120"/>
           </a:xfrm>
           <a:prstGeom prst="rect">
             <a:avLst/>
@@ -10223,7 +10134,7 @@
         <p:spPr>
           <a:xfrm>
             <a:off x="117360" y="91440"/>
-            <a:ext cx="8889120" cy="4986000"/>
+            <a:ext cx="8888760" cy="4985640"/>
           </a:xfrm>
           <a:prstGeom prst="rect">
             <a:avLst/>
@@ -10324,7 +10235,7 @@
             </a:endParaRPr>
           </a:p>
           <a:p>
-            <a:pPr marL="457200" indent="-316440">
+            <a:pPr marL="457200" indent="-316080">
               <a:lnSpc>
                 <a:spcPct val="115000"/>
               </a:lnSpc>
@@ -10352,7 +10263,7 @@
             </a:endParaRPr>
           </a:p>
           <a:p>
-            <a:pPr marL="457200" indent="-316440">
+            <a:pPr marL="457200" indent="-316080">
               <a:lnSpc>
                 <a:spcPct val="115000"/>
               </a:lnSpc>
@@ -10377,7 +10288,7 @@
             </a:endParaRPr>
           </a:p>
           <a:p>
-            <a:pPr marL="457200" indent="-316440">
+            <a:pPr marL="457200" indent="-316080">
               <a:lnSpc>
                 <a:spcPct val="115000"/>
               </a:lnSpc>
@@ -10415,7 +10326,7 @@
             </a:endParaRPr>
           </a:p>
           <a:p>
-            <a:pPr>
+            <a:pPr marL="457200">
               <a:lnSpc>
                 <a:spcPct val="7000"/>
               </a:lnSpc>
@@ -10438,7 +10349,7 @@
             </a:endParaRPr>
           </a:p>
           <a:p>
-            <a:pPr marL="457200" indent="-316440">
+            <a:pPr marL="457200" indent="-316080">
               <a:lnSpc>
                 <a:spcPct val="115000"/>
               </a:lnSpc>
@@ -10466,7 +10377,7 @@
             </a:endParaRPr>
           </a:p>
           <a:p>
-            <a:pPr marL="457200" indent="-316440">
+            <a:pPr marL="457200" indent="-316080">
               <a:lnSpc>
                 <a:spcPct val="115000"/>
               </a:lnSpc>
@@ -10491,7 +10402,7 @@
             </a:endParaRPr>
           </a:p>
           <a:p>
-            <a:pPr marL="457200" indent="-316440">
+            <a:pPr marL="457200" indent="-316080">
               <a:lnSpc>
                 <a:spcPct val="115000"/>
               </a:lnSpc>
@@ -10552,7 +10463,7 @@
         <p:spPr>
           <a:xfrm>
             <a:off x="134640" y="-18360"/>
-            <a:ext cx="2792520" cy="573480"/>
+            <a:ext cx="2792160" cy="573120"/>
           </a:xfrm>
           <a:prstGeom prst="rect">
             <a:avLst/>

</xml_diff>